<commit_message>
adding more screen shots
</commit_message>
<xml_diff>
--- a/report/datadog_billshelton.pptx
+++ b/report/datadog_billshelton.pptx
@@ -5,13 +5,26 @@
     <p:sldMasterId id="2147483708" r:id="rId1"/>
   </p:sldMasterIdLst>
   <p:notesMasterIdLst>
-    <p:notesMasterId r:id="rId6"/>
+    <p:notesMasterId r:id="rId19"/>
   </p:notesMasterIdLst>
   <p:sldIdLst>
     <p:sldId id="256" r:id="rId2"/>
     <p:sldId id="257" r:id="rId3"/>
-    <p:sldId id="268" r:id="rId4"/>
-    <p:sldId id="269" r:id="rId5"/>
+    <p:sldId id="276" r:id="rId4"/>
+    <p:sldId id="279" r:id="rId5"/>
+    <p:sldId id="277" r:id="rId6"/>
+    <p:sldId id="278" r:id="rId7"/>
+    <p:sldId id="272" r:id="rId8"/>
+    <p:sldId id="280" r:id="rId9"/>
+    <p:sldId id="281" r:id="rId10"/>
+    <p:sldId id="273" r:id="rId11"/>
+    <p:sldId id="282" r:id="rId12"/>
+    <p:sldId id="274" r:id="rId13"/>
+    <p:sldId id="283" r:id="rId14"/>
+    <p:sldId id="284" r:id="rId15"/>
+    <p:sldId id="275" r:id="rId16"/>
+    <p:sldId id="268" r:id="rId17"/>
+    <p:sldId id="269" r:id="rId18"/>
   </p:sldIdLst>
   <p:sldSz cx="9144000" cy="6858000" type="screen4x3"/>
   <p:notesSz cx="6858000" cy="9144000"/>
@@ -3675,6 +3688,1225 @@
 </p:sld>
 </file>
 
+<file path=ppt/slides/slide10.xml><?xml version="1.0" encoding="utf-8"?>
+<p:sld xmlns:a="http://schemas.openxmlformats.org/drawingml/2006/main" xmlns:r="http://schemas.openxmlformats.org/officeDocument/2006/relationships" xmlns:p="http://schemas.openxmlformats.org/presentationml/2006/main">
+  <p:cSld>
+    <p:spTree>
+      <p:nvGrpSpPr>
+        <p:cNvPr id="1" name=""/>
+        <p:cNvGrpSpPr/>
+        <p:nvPr/>
+      </p:nvGrpSpPr>
+      <p:grpSpPr>
+        <a:xfrm>
+          <a:off x="0" y="0"/>
+          <a:ext cx="0" cy="0"/>
+          <a:chOff x="0" y="0"/>
+          <a:chExt cx="0" cy="0"/>
+        </a:xfrm>
+      </p:grpSpPr>
+      <p:sp>
+        <p:nvSpPr>
+          <p:cNvPr id="2" name="Title 1"/>
+          <p:cNvSpPr>
+            <a:spLocks noGrp="1"/>
+          </p:cNvSpPr>
+          <p:nvPr>
+            <p:ph type="title"/>
+          </p:nvPr>
+        </p:nvSpPr>
+        <p:spPr>
+          <a:xfrm>
+            <a:off x="546832" y="-124742"/>
+            <a:ext cx="8014594" cy="1143000"/>
+          </a:xfrm>
+        </p:spPr>
+        <p:txBody>
+          <a:bodyPr/>
+          <a:lstStyle/>
+          <a:p>
+            <a:r>
+              <a:rPr lang="en-US" dirty="0" smtClean="0">
+                <a:solidFill>
+                  <a:schemeClr val="tx1"/>
+                </a:solidFill>
+              </a:rPr>
+              <a:t>Monitoring Data</a:t>
+            </a:r>
+            <a:endParaRPr lang="en-US" dirty="0">
+              <a:solidFill>
+                <a:schemeClr val="tx1"/>
+              </a:solidFill>
+            </a:endParaRPr>
+          </a:p>
+        </p:txBody>
+      </p:sp>
+      <p:sp>
+        <p:nvSpPr>
+          <p:cNvPr id="3" name="TextBox 2"/>
+          <p:cNvSpPr txBox="1"/>
+          <p:nvPr/>
+        </p:nvSpPr>
+        <p:spPr>
+          <a:xfrm>
+            <a:off x="192282" y="820452"/>
+            <a:ext cx="8241507" cy="8679298"/>
+          </a:xfrm>
+          <a:prstGeom prst="rect">
+            <a:avLst/>
+          </a:prstGeom>
+          <a:noFill/>
+        </p:spPr>
+        <p:txBody>
+          <a:bodyPr wrap="square" rtlCol="0">
+            <a:spAutoFit/>
+          </a:bodyPr>
+          <a:lstStyle/>
+          <a:p>
+            <a:r>
+              <a:rPr lang="en-US" dirty="0"/>
+              <a:t>Since you’ve already caught your test metric going above 800 once, you don’t want to have to continually watch this dashboard to be alerted when it goes above 800 again. So let’s make life easier by creating a monitor.</a:t>
+            </a:r>
+          </a:p>
+          <a:p>
+            <a:endParaRPr lang="en-US" dirty="0"/>
+          </a:p>
+          <a:p>
+            <a:r>
+              <a:rPr lang="en-US" dirty="0"/>
+              <a:t>Create a new Metric Monitor that watches the average of your custom metric (</a:t>
+            </a:r>
+            <a:r>
+              <a:rPr lang="en-US" dirty="0" err="1"/>
+              <a:t>my_metric</a:t>
+            </a:r>
+            <a:r>
+              <a:rPr lang="en-US" dirty="0"/>
+              <a:t>) and will alert if it’s above the following values over the past 5 minutes:</a:t>
+            </a:r>
+          </a:p>
+          <a:p>
+            <a:endParaRPr lang="en-US" dirty="0"/>
+          </a:p>
+          <a:p>
+            <a:r>
+              <a:rPr lang="en-US" dirty="0"/>
+              <a:t>* Warning threshold of 500</a:t>
+            </a:r>
+          </a:p>
+          <a:p>
+            <a:r>
+              <a:rPr lang="en-US" dirty="0"/>
+              <a:t>* Alerting threshold of 800</a:t>
+            </a:r>
+          </a:p>
+          <a:p>
+            <a:pPr marL="285750" indent="-285750">
+              <a:buFontTx/>
+              <a:buChar char="•"/>
+            </a:pPr>
+            <a:r>
+              <a:rPr lang="en-US" dirty="0" smtClean="0"/>
+              <a:t>And </a:t>
+            </a:r>
+            <a:r>
+              <a:rPr lang="en-US" dirty="0"/>
+              <a:t>also ensure that it will notify you if there is No Data for this query over the past 10m</a:t>
+            </a:r>
+            <a:r>
+              <a:rPr lang="en-US" dirty="0" smtClean="0"/>
+              <a:t>.</a:t>
+            </a:r>
+          </a:p>
+          <a:p>
+            <a:pPr marL="285750" indent="-285750">
+              <a:buFontTx/>
+              <a:buChar char="•"/>
+            </a:pPr>
+            <a:endParaRPr lang="en-US" dirty="0"/>
+          </a:p>
+          <a:p>
+            <a:pPr marL="285750" indent="-285750">
+              <a:buFontTx/>
+              <a:buChar char="•"/>
+            </a:pPr>
+            <a:endParaRPr lang="en-US" dirty="0" smtClean="0"/>
+          </a:p>
+          <a:p>
+            <a:r>
+              <a:rPr lang="en-US" dirty="0"/>
+              <a:t>Please configure the monitor’s message so that it will:</a:t>
+            </a:r>
+          </a:p>
+          <a:p>
+            <a:endParaRPr lang="en-US" dirty="0"/>
+          </a:p>
+          <a:p>
+            <a:r>
+              <a:rPr lang="en-US" dirty="0"/>
+              <a:t>* Send you an email whenever the monitor triggers.</a:t>
+            </a:r>
+          </a:p>
+          <a:p>
+            <a:r>
+              <a:rPr lang="en-US" dirty="0"/>
+              <a:t>* Create different messages based on whether the monitor is in an Alert, Warning, or No Data state.</a:t>
+            </a:r>
+          </a:p>
+          <a:p>
+            <a:r>
+              <a:rPr lang="en-US" dirty="0"/>
+              <a:t>* Include the metric value that caused the monitor to trigger and host </a:t>
+            </a:r>
+            <a:r>
+              <a:rPr lang="en-US" dirty="0" err="1"/>
+              <a:t>ip</a:t>
+            </a:r>
+            <a:r>
+              <a:rPr lang="en-US" dirty="0"/>
+              <a:t> when the Monitor triggers an Alert state.</a:t>
+            </a:r>
+          </a:p>
+          <a:p>
+            <a:r>
+              <a:rPr lang="en-US" dirty="0"/>
+              <a:t>* When this monitor sends you an email notification, take a screenshot of the email that it sends you.</a:t>
+            </a:r>
+          </a:p>
+          <a:p>
+            <a:endParaRPr lang="en-US" dirty="0"/>
+          </a:p>
+          <a:p>
+            <a:r>
+              <a:rPr lang="en-US" dirty="0"/>
+              <a:t>* **Bonus Question**: Since this monitor is going to alert pretty often, you don’t want to be alerted when you are out of the office. Set up two scheduled downtimes for this monitor:</a:t>
+            </a:r>
+          </a:p>
+          <a:p>
+            <a:endParaRPr lang="en-US" dirty="0"/>
+          </a:p>
+          <a:p>
+            <a:r>
+              <a:rPr lang="en-US" dirty="0"/>
+              <a:t>  * One that silences it from 7pm to 9am daily on M-F,</a:t>
+            </a:r>
+          </a:p>
+          <a:p>
+            <a:r>
+              <a:rPr lang="en-US" dirty="0"/>
+              <a:t>  * And one that silences it all day on Sat-Sun.</a:t>
+            </a:r>
+          </a:p>
+          <a:p>
+            <a:r>
+              <a:rPr lang="en-US" dirty="0"/>
+              <a:t>  * Make sure that your email is notified when you schedule the downtime and take a screenshot of that notification.</a:t>
+            </a:r>
+          </a:p>
+        </p:txBody>
+      </p:sp>
+    </p:spTree>
+    <p:extLst>
+      <p:ext uri="{BB962C8B-B14F-4D97-AF65-F5344CB8AC3E}">
+        <p14:creationId xmlns:p14="http://schemas.microsoft.com/office/powerpoint/2010/main" val="1535764977"/>
+      </p:ext>
+    </p:extLst>
+  </p:cSld>
+  <p:clrMapOvr>
+    <a:masterClrMapping/>
+  </p:clrMapOvr>
+</p:sld>
+</file>
+
+<file path=ppt/slides/slide11.xml><?xml version="1.0" encoding="utf-8"?>
+<p:sld xmlns:a="http://schemas.openxmlformats.org/drawingml/2006/main" xmlns:r="http://schemas.openxmlformats.org/officeDocument/2006/relationships" xmlns:p="http://schemas.openxmlformats.org/presentationml/2006/main">
+  <p:cSld>
+    <p:spTree>
+      <p:nvGrpSpPr>
+        <p:cNvPr id="1" name=""/>
+        <p:cNvGrpSpPr/>
+        <p:nvPr/>
+      </p:nvGrpSpPr>
+      <p:grpSpPr>
+        <a:xfrm>
+          <a:off x="0" y="0"/>
+          <a:ext cx="0" cy="0"/>
+          <a:chOff x="0" y="0"/>
+          <a:chExt cx="0" cy="0"/>
+        </a:xfrm>
+      </p:grpSpPr>
+      <p:sp>
+        <p:nvSpPr>
+          <p:cNvPr id="2" name="Title 1"/>
+          <p:cNvSpPr>
+            <a:spLocks noGrp="1"/>
+          </p:cNvSpPr>
+          <p:nvPr>
+            <p:ph type="title"/>
+          </p:nvPr>
+        </p:nvSpPr>
+        <p:spPr>
+          <a:xfrm>
+            <a:off x="546832" y="-124742"/>
+            <a:ext cx="8014594" cy="1143000"/>
+          </a:xfrm>
+        </p:spPr>
+        <p:txBody>
+          <a:bodyPr/>
+          <a:lstStyle/>
+          <a:p>
+            <a:r>
+              <a:rPr lang="en-US" dirty="0" smtClean="0">
+                <a:solidFill>
+                  <a:schemeClr val="tx1"/>
+                </a:solidFill>
+              </a:rPr>
+              <a:t>Monitoring Data</a:t>
+            </a:r>
+            <a:endParaRPr lang="en-US" dirty="0">
+              <a:solidFill>
+                <a:schemeClr val="tx1"/>
+              </a:solidFill>
+            </a:endParaRPr>
+          </a:p>
+        </p:txBody>
+      </p:sp>
+      <p:sp>
+        <p:nvSpPr>
+          <p:cNvPr id="3" name="TextBox 2"/>
+          <p:cNvSpPr txBox="1"/>
+          <p:nvPr/>
+        </p:nvSpPr>
+        <p:spPr>
+          <a:xfrm>
+            <a:off x="192282" y="820452"/>
+            <a:ext cx="8241507" cy="8679298"/>
+          </a:xfrm>
+          <a:prstGeom prst="rect">
+            <a:avLst/>
+          </a:prstGeom>
+          <a:noFill/>
+        </p:spPr>
+        <p:txBody>
+          <a:bodyPr wrap="square" rtlCol="0">
+            <a:spAutoFit/>
+          </a:bodyPr>
+          <a:lstStyle/>
+          <a:p>
+            <a:r>
+              <a:rPr lang="en-US" dirty="0"/>
+              <a:t>Since you’ve already caught your test metric going above 800 once, you don’t want to have to continually watch this dashboard to be alerted when it goes above 800 again. So let’s make life easier by creating a monitor.</a:t>
+            </a:r>
+          </a:p>
+          <a:p>
+            <a:endParaRPr lang="en-US" dirty="0"/>
+          </a:p>
+          <a:p>
+            <a:r>
+              <a:rPr lang="en-US" dirty="0"/>
+              <a:t>Create a new Metric Monitor that watches the average of your custom metric (</a:t>
+            </a:r>
+            <a:r>
+              <a:rPr lang="en-US" dirty="0" err="1"/>
+              <a:t>my_metric</a:t>
+            </a:r>
+            <a:r>
+              <a:rPr lang="en-US" dirty="0"/>
+              <a:t>) and will alert if it’s above the following values over the past 5 minutes:</a:t>
+            </a:r>
+          </a:p>
+          <a:p>
+            <a:endParaRPr lang="en-US" dirty="0"/>
+          </a:p>
+          <a:p>
+            <a:r>
+              <a:rPr lang="en-US" dirty="0"/>
+              <a:t>* Warning threshold of 500</a:t>
+            </a:r>
+          </a:p>
+          <a:p>
+            <a:r>
+              <a:rPr lang="en-US" dirty="0"/>
+              <a:t>* Alerting threshold of 800</a:t>
+            </a:r>
+          </a:p>
+          <a:p>
+            <a:pPr marL="285750" indent="-285750">
+              <a:buFontTx/>
+              <a:buChar char="•"/>
+            </a:pPr>
+            <a:r>
+              <a:rPr lang="en-US" dirty="0" smtClean="0"/>
+              <a:t>And </a:t>
+            </a:r>
+            <a:r>
+              <a:rPr lang="en-US" dirty="0"/>
+              <a:t>also ensure that it will notify you if there is No Data for this query over the past 10m</a:t>
+            </a:r>
+            <a:r>
+              <a:rPr lang="en-US" dirty="0" smtClean="0"/>
+              <a:t>.</a:t>
+            </a:r>
+          </a:p>
+          <a:p>
+            <a:pPr marL="285750" indent="-285750">
+              <a:buFontTx/>
+              <a:buChar char="•"/>
+            </a:pPr>
+            <a:endParaRPr lang="en-US" dirty="0"/>
+          </a:p>
+          <a:p>
+            <a:pPr marL="285750" indent="-285750">
+              <a:buFontTx/>
+              <a:buChar char="•"/>
+            </a:pPr>
+            <a:endParaRPr lang="en-US" dirty="0" smtClean="0"/>
+          </a:p>
+          <a:p>
+            <a:r>
+              <a:rPr lang="en-US" dirty="0"/>
+              <a:t>Please configure the monitor’s message so that it will:</a:t>
+            </a:r>
+          </a:p>
+          <a:p>
+            <a:endParaRPr lang="en-US" dirty="0"/>
+          </a:p>
+          <a:p>
+            <a:r>
+              <a:rPr lang="en-US" dirty="0"/>
+              <a:t>* Send you an email whenever the monitor triggers.</a:t>
+            </a:r>
+          </a:p>
+          <a:p>
+            <a:r>
+              <a:rPr lang="en-US" dirty="0"/>
+              <a:t>* Create different messages based on whether the monitor is in an Alert, Warning, or No Data state.</a:t>
+            </a:r>
+          </a:p>
+          <a:p>
+            <a:r>
+              <a:rPr lang="en-US" dirty="0"/>
+              <a:t>* Include the metric value that caused the monitor to trigger and host </a:t>
+            </a:r>
+            <a:r>
+              <a:rPr lang="en-US" dirty="0" err="1"/>
+              <a:t>ip</a:t>
+            </a:r>
+            <a:r>
+              <a:rPr lang="en-US" dirty="0"/>
+              <a:t> when the Monitor triggers an Alert state.</a:t>
+            </a:r>
+          </a:p>
+          <a:p>
+            <a:r>
+              <a:rPr lang="en-US" dirty="0"/>
+              <a:t>* When this monitor sends you an email notification, take a screenshot of the email that it sends you.</a:t>
+            </a:r>
+          </a:p>
+          <a:p>
+            <a:endParaRPr lang="en-US" dirty="0"/>
+          </a:p>
+          <a:p>
+            <a:r>
+              <a:rPr lang="en-US" dirty="0"/>
+              <a:t>* **Bonus Question**: Since this monitor is going to alert pretty often, you don’t want to be alerted when you are out of the office. Set up two scheduled downtimes for this monitor:</a:t>
+            </a:r>
+          </a:p>
+          <a:p>
+            <a:endParaRPr lang="en-US" dirty="0"/>
+          </a:p>
+          <a:p>
+            <a:r>
+              <a:rPr lang="en-US" dirty="0"/>
+              <a:t>  * One that silences it from 7pm to 9am daily on M-F,</a:t>
+            </a:r>
+          </a:p>
+          <a:p>
+            <a:r>
+              <a:rPr lang="en-US" dirty="0"/>
+              <a:t>  * And one that silences it all day on Sat-Sun.</a:t>
+            </a:r>
+          </a:p>
+          <a:p>
+            <a:r>
+              <a:rPr lang="en-US" dirty="0"/>
+              <a:t>  * Make sure that your email is notified when you schedule the downtime and take a screenshot of that notification.</a:t>
+            </a:r>
+          </a:p>
+        </p:txBody>
+      </p:sp>
+    </p:spTree>
+    <p:extLst>
+      <p:ext uri="{BB962C8B-B14F-4D97-AF65-F5344CB8AC3E}">
+        <p14:creationId xmlns:p14="http://schemas.microsoft.com/office/powerpoint/2010/main" val="660703615"/>
+      </p:ext>
+    </p:extLst>
+  </p:cSld>
+  <p:clrMapOvr>
+    <a:masterClrMapping/>
+  </p:clrMapOvr>
+</p:sld>
+</file>
+
+<file path=ppt/slides/slide12.xml><?xml version="1.0" encoding="utf-8"?>
+<p:sld xmlns:a="http://schemas.openxmlformats.org/drawingml/2006/main" xmlns:r="http://schemas.openxmlformats.org/officeDocument/2006/relationships" xmlns:p="http://schemas.openxmlformats.org/presentationml/2006/main">
+  <p:cSld>
+    <p:spTree>
+      <p:nvGrpSpPr>
+        <p:cNvPr id="1" name=""/>
+        <p:cNvGrpSpPr/>
+        <p:nvPr/>
+      </p:nvGrpSpPr>
+      <p:grpSpPr>
+        <a:xfrm>
+          <a:off x="0" y="0"/>
+          <a:ext cx="0" cy="0"/>
+          <a:chOff x="0" y="0"/>
+          <a:chExt cx="0" cy="0"/>
+        </a:xfrm>
+      </p:grpSpPr>
+      <p:sp>
+        <p:nvSpPr>
+          <p:cNvPr id="2" name="Title 1"/>
+          <p:cNvSpPr>
+            <a:spLocks noGrp="1"/>
+          </p:cNvSpPr>
+          <p:nvPr>
+            <p:ph type="title"/>
+          </p:nvPr>
+        </p:nvSpPr>
+        <p:spPr>
+          <a:xfrm>
+            <a:off x="546832" y="-124742"/>
+            <a:ext cx="8014594" cy="1143000"/>
+          </a:xfrm>
+        </p:spPr>
+        <p:txBody>
+          <a:bodyPr/>
+          <a:lstStyle/>
+          <a:p>
+            <a:r>
+              <a:rPr lang="en-US" dirty="0" smtClean="0">
+                <a:solidFill>
+                  <a:schemeClr val="tx1"/>
+                </a:solidFill>
+              </a:rPr>
+              <a:t>Collecting APM Data</a:t>
+            </a:r>
+            <a:endParaRPr lang="en-US" dirty="0">
+              <a:solidFill>
+                <a:schemeClr val="tx1"/>
+              </a:solidFill>
+            </a:endParaRPr>
+          </a:p>
+        </p:txBody>
+      </p:sp>
+      <p:sp>
+        <p:nvSpPr>
+          <p:cNvPr id="3" name="TextBox 2"/>
+          <p:cNvSpPr txBox="1"/>
+          <p:nvPr/>
+        </p:nvSpPr>
+        <p:spPr>
+          <a:xfrm>
+            <a:off x="192282" y="820452"/>
+            <a:ext cx="8241507" cy="3970318"/>
+          </a:xfrm>
+          <a:prstGeom prst="rect">
+            <a:avLst/>
+          </a:prstGeom>
+          <a:noFill/>
+        </p:spPr>
+        <p:txBody>
+          <a:bodyPr wrap="square" rtlCol="0">
+            <a:spAutoFit/>
+          </a:bodyPr>
+          <a:lstStyle/>
+          <a:p>
+            <a:r>
+              <a:rPr lang="en-US" dirty="0"/>
+              <a:t>Given the following Flask app (or any Python/Ruby/Go app of your choice) instrument this using </a:t>
+            </a:r>
+            <a:r>
+              <a:rPr lang="en-US" dirty="0" err="1"/>
+              <a:t>Datadog’s</a:t>
+            </a:r>
+            <a:r>
+              <a:rPr lang="en-US" dirty="0"/>
+              <a:t> APM solution</a:t>
+            </a:r>
+            <a:r>
+              <a:rPr lang="en-US" dirty="0" smtClean="0"/>
+              <a:t>:</a:t>
+            </a:r>
+          </a:p>
+          <a:p>
+            <a:endParaRPr lang="en-US" dirty="0"/>
+          </a:p>
+          <a:p>
+            <a:endParaRPr lang="en-US" dirty="0" smtClean="0"/>
+          </a:p>
+          <a:p>
+            <a:endParaRPr lang="en-US" dirty="0"/>
+          </a:p>
+          <a:p>
+            <a:r>
+              <a:rPr lang="en-US" dirty="0"/>
+              <a:t>* **Note**: Using both </a:t>
+            </a:r>
+            <a:r>
+              <a:rPr lang="en-US" dirty="0" err="1"/>
+              <a:t>ddtrace</a:t>
+            </a:r>
+            <a:r>
+              <a:rPr lang="en-US" dirty="0"/>
+              <a:t>-run and manually inserting the Middleware has been known to cause issues. Please only use one or the other.</a:t>
+            </a:r>
+          </a:p>
+          <a:p>
+            <a:endParaRPr lang="en-US" dirty="0"/>
+          </a:p>
+          <a:p>
+            <a:r>
+              <a:rPr lang="en-US" dirty="0"/>
+              <a:t>* **Bonus Question**: What is the difference between a Service and a Resource?</a:t>
+            </a:r>
+          </a:p>
+          <a:p>
+            <a:endParaRPr lang="en-US" dirty="0"/>
+          </a:p>
+          <a:p>
+            <a:r>
+              <a:rPr lang="en-US" dirty="0"/>
+              <a:t>Provide a link and a screenshot of a Dashboard with both APM and Infrastructure Metrics.</a:t>
+            </a:r>
+          </a:p>
+          <a:p>
+            <a:endParaRPr lang="en-US" dirty="0"/>
+          </a:p>
+          <a:p>
+            <a:r>
+              <a:rPr lang="en-US" dirty="0"/>
+              <a:t>Please include your fully instrumented app in your submission, as well</a:t>
+            </a:r>
+            <a:r>
+              <a:rPr lang="en-US" dirty="0" smtClean="0"/>
+              <a:t>.</a:t>
+            </a:r>
+            <a:endParaRPr lang="en-US" dirty="0"/>
+          </a:p>
+        </p:txBody>
+      </p:sp>
+    </p:spTree>
+    <p:extLst>
+      <p:ext uri="{BB962C8B-B14F-4D97-AF65-F5344CB8AC3E}">
+        <p14:creationId xmlns:p14="http://schemas.microsoft.com/office/powerpoint/2010/main" val="236926291"/>
+      </p:ext>
+    </p:extLst>
+  </p:cSld>
+  <p:clrMapOvr>
+    <a:masterClrMapping/>
+  </p:clrMapOvr>
+</p:sld>
+</file>
+
+<file path=ppt/slides/slide13.xml><?xml version="1.0" encoding="utf-8"?>
+<p:sld xmlns:a="http://schemas.openxmlformats.org/drawingml/2006/main" xmlns:r="http://schemas.openxmlformats.org/officeDocument/2006/relationships" xmlns:p="http://schemas.openxmlformats.org/presentationml/2006/main">
+  <p:cSld>
+    <p:spTree>
+      <p:nvGrpSpPr>
+        <p:cNvPr id="1" name=""/>
+        <p:cNvGrpSpPr/>
+        <p:nvPr/>
+      </p:nvGrpSpPr>
+      <p:grpSpPr>
+        <a:xfrm>
+          <a:off x="0" y="0"/>
+          <a:ext cx="0" cy="0"/>
+          <a:chOff x="0" y="0"/>
+          <a:chExt cx="0" cy="0"/>
+        </a:xfrm>
+      </p:grpSpPr>
+      <p:sp>
+        <p:nvSpPr>
+          <p:cNvPr id="2" name="Title 1"/>
+          <p:cNvSpPr>
+            <a:spLocks noGrp="1"/>
+          </p:cNvSpPr>
+          <p:nvPr>
+            <p:ph type="title"/>
+          </p:nvPr>
+        </p:nvSpPr>
+        <p:spPr>
+          <a:xfrm>
+            <a:off x="546832" y="-124742"/>
+            <a:ext cx="8014594" cy="1143000"/>
+          </a:xfrm>
+        </p:spPr>
+        <p:txBody>
+          <a:bodyPr/>
+          <a:lstStyle/>
+          <a:p>
+            <a:r>
+              <a:rPr lang="en-US" dirty="0" smtClean="0">
+                <a:solidFill>
+                  <a:schemeClr val="tx1"/>
+                </a:solidFill>
+              </a:rPr>
+              <a:t>Collecting APM Data</a:t>
+            </a:r>
+            <a:endParaRPr lang="en-US" dirty="0">
+              <a:solidFill>
+                <a:schemeClr val="tx1"/>
+              </a:solidFill>
+            </a:endParaRPr>
+          </a:p>
+        </p:txBody>
+      </p:sp>
+      <p:sp>
+        <p:nvSpPr>
+          <p:cNvPr id="3" name="TextBox 2"/>
+          <p:cNvSpPr txBox="1"/>
+          <p:nvPr/>
+        </p:nvSpPr>
+        <p:spPr>
+          <a:xfrm>
+            <a:off x="112412" y="5593198"/>
+            <a:ext cx="8241507" cy="923330"/>
+          </a:xfrm>
+          <a:prstGeom prst="rect">
+            <a:avLst/>
+          </a:prstGeom>
+          <a:noFill/>
+        </p:spPr>
+        <p:txBody>
+          <a:bodyPr wrap="square" rtlCol="0">
+            <a:spAutoFit/>
+          </a:bodyPr>
+          <a:lstStyle/>
+          <a:p>
+            <a:endParaRPr lang="en-US" dirty="0"/>
+          </a:p>
+          <a:p>
+            <a:r>
+              <a:rPr lang="en-US" dirty="0" smtClean="0"/>
+              <a:t>What </a:t>
+            </a:r>
+            <a:r>
+              <a:rPr lang="en-US" dirty="0"/>
+              <a:t>is the difference between a Service and a Resource?</a:t>
+            </a:r>
+          </a:p>
+          <a:p>
+            <a:endParaRPr lang="en-US" dirty="0"/>
+          </a:p>
+        </p:txBody>
+      </p:sp>
+      <p:pic>
+        <p:nvPicPr>
+          <p:cNvPr id="4" name="Picture 3" descr="Screen Shot 2020-04-01 at 9.21.16 AM.png"/>
+          <p:cNvPicPr>
+            <a:picLocks noChangeAspect="1"/>
+          </p:cNvPicPr>
+          <p:nvPr/>
+        </p:nvPicPr>
+        <p:blipFill>
+          <a:blip r:embed="rId2">
+            <a:extLst>
+              <a:ext uri="{28A0092B-C50C-407E-A947-70E740481C1C}">
+                <a14:useLocalDpi xmlns:a14="http://schemas.microsoft.com/office/drawing/2010/main" val="0"/>
+              </a:ext>
+            </a:extLst>
+          </a:blip>
+          <a:stretch>
+            <a:fillRect/>
+          </a:stretch>
+        </p:blipFill>
+        <p:spPr>
+          <a:xfrm>
+            <a:off x="1236020" y="851813"/>
+            <a:ext cx="6112064" cy="4752725"/>
+          </a:xfrm>
+          <a:prstGeom prst="rect">
+            <a:avLst/>
+          </a:prstGeom>
+        </p:spPr>
+      </p:pic>
+    </p:spTree>
+    <p:extLst>
+      <p:ext uri="{BB962C8B-B14F-4D97-AF65-F5344CB8AC3E}">
+        <p14:creationId xmlns:p14="http://schemas.microsoft.com/office/powerpoint/2010/main" val="4238635660"/>
+      </p:ext>
+    </p:extLst>
+  </p:cSld>
+  <p:clrMapOvr>
+    <a:masterClrMapping/>
+  </p:clrMapOvr>
+</p:sld>
+</file>
+
+<file path=ppt/slides/slide14.xml><?xml version="1.0" encoding="utf-8"?>
+<p:sld xmlns:a="http://schemas.openxmlformats.org/drawingml/2006/main" xmlns:r="http://schemas.openxmlformats.org/officeDocument/2006/relationships" xmlns:p="http://schemas.openxmlformats.org/presentationml/2006/main">
+  <p:cSld>
+    <p:spTree>
+      <p:nvGrpSpPr>
+        <p:cNvPr id="1" name=""/>
+        <p:cNvGrpSpPr/>
+        <p:nvPr/>
+      </p:nvGrpSpPr>
+      <p:grpSpPr>
+        <a:xfrm>
+          <a:off x="0" y="0"/>
+          <a:ext cx="0" cy="0"/>
+          <a:chOff x="0" y="0"/>
+          <a:chExt cx="0" cy="0"/>
+        </a:xfrm>
+      </p:grpSpPr>
+      <p:sp>
+        <p:nvSpPr>
+          <p:cNvPr id="2" name="Title 1"/>
+          <p:cNvSpPr>
+            <a:spLocks noGrp="1"/>
+          </p:cNvSpPr>
+          <p:nvPr>
+            <p:ph type="title"/>
+          </p:nvPr>
+        </p:nvSpPr>
+        <p:spPr>
+          <a:xfrm>
+            <a:off x="546832" y="-124742"/>
+            <a:ext cx="8014594" cy="1143000"/>
+          </a:xfrm>
+        </p:spPr>
+        <p:txBody>
+          <a:bodyPr/>
+          <a:lstStyle/>
+          <a:p>
+            <a:r>
+              <a:rPr lang="en-US" dirty="0" smtClean="0">
+                <a:solidFill>
+                  <a:schemeClr val="tx1"/>
+                </a:solidFill>
+              </a:rPr>
+              <a:t>Collecting APM Data</a:t>
+            </a:r>
+            <a:endParaRPr lang="en-US" dirty="0">
+              <a:solidFill>
+                <a:schemeClr val="tx1"/>
+              </a:solidFill>
+            </a:endParaRPr>
+          </a:p>
+        </p:txBody>
+      </p:sp>
+      <p:pic>
+        <p:nvPicPr>
+          <p:cNvPr id="6" name="Picture 5" descr="Screen Shot 2020-04-01 at 9.29.52 AM.png"/>
+          <p:cNvPicPr>
+            <a:picLocks noChangeAspect="1"/>
+          </p:cNvPicPr>
+          <p:nvPr/>
+        </p:nvPicPr>
+        <p:blipFill>
+          <a:blip r:embed="rId2">
+            <a:extLst>
+              <a:ext uri="{28A0092B-C50C-407E-A947-70E740481C1C}">
+                <a14:useLocalDpi xmlns:a14="http://schemas.microsoft.com/office/drawing/2010/main" val="0"/>
+              </a:ext>
+            </a:extLst>
+          </a:blip>
+          <a:stretch>
+            <a:fillRect/>
+          </a:stretch>
+        </p:blipFill>
+        <p:spPr>
+          <a:xfrm>
+            <a:off x="626210" y="1595425"/>
+            <a:ext cx="7472821" cy="3485556"/>
+          </a:xfrm>
+          <a:prstGeom prst="rect">
+            <a:avLst/>
+          </a:prstGeom>
+        </p:spPr>
+      </p:pic>
+    </p:spTree>
+    <p:extLst>
+      <p:ext uri="{BB962C8B-B14F-4D97-AF65-F5344CB8AC3E}">
+        <p14:creationId xmlns:p14="http://schemas.microsoft.com/office/powerpoint/2010/main" val="2193043525"/>
+      </p:ext>
+    </p:extLst>
+  </p:cSld>
+  <p:clrMapOvr>
+    <a:masterClrMapping/>
+  </p:clrMapOvr>
+</p:sld>
+</file>
+
+<file path=ppt/slides/slide15.xml><?xml version="1.0" encoding="utf-8"?>
+<p:sld xmlns:a="http://schemas.openxmlformats.org/drawingml/2006/main" xmlns:r="http://schemas.openxmlformats.org/officeDocument/2006/relationships" xmlns:p="http://schemas.openxmlformats.org/presentationml/2006/main">
+  <p:cSld>
+    <p:spTree>
+      <p:nvGrpSpPr>
+        <p:cNvPr id="1" name=""/>
+        <p:cNvGrpSpPr/>
+        <p:nvPr/>
+      </p:nvGrpSpPr>
+      <p:grpSpPr>
+        <a:xfrm>
+          <a:off x="0" y="0"/>
+          <a:ext cx="0" cy="0"/>
+          <a:chOff x="0" y="0"/>
+          <a:chExt cx="0" cy="0"/>
+        </a:xfrm>
+      </p:grpSpPr>
+      <p:sp>
+        <p:nvSpPr>
+          <p:cNvPr id="2" name="Title 1"/>
+          <p:cNvSpPr>
+            <a:spLocks noGrp="1"/>
+          </p:cNvSpPr>
+          <p:nvPr>
+            <p:ph type="title"/>
+          </p:nvPr>
+        </p:nvSpPr>
+        <p:spPr>
+          <a:xfrm>
+            <a:off x="-497" y="-124742"/>
+            <a:ext cx="8595936" cy="1143000"/>
+          </a:xfrm>
+        </p:spPr>
+        <p:txBody>
+          <a:bodyPr/>
+          <a:lstStyle/>
+          <a:p>
+            <a:r>
+              <a:rPr lang="en-US" dirty="0" smtClean="0">
+                <a:solidFill>
+                  <a:schemeClr val="tx1"/>
+                </a:solidFill>
+              </a:rPr>
+              <a:t>What Would You Use </a:t>
+            </a:r>
+            <a:r>
+              <a:rPr lang="en-US" dirty="0" err="1" smtClean="0">
+                <a:solidFill>
+                  <a:schemeClr val="tx1"/>
+                </a:solidFill>
+              </a:rPr>
+              <a:t>Datadog</a:t>
+            </a:r>
+            <a:r>
+              <a:rPr lang="en-US" dirty="0" smtClean="0">
+                <a:solidFill>
+                  <a:schemeClr val="tx1"/>
+                </a:solidFill>
+              </a:rPr>
+              <a:t> For?</a:t>
+            </a:r>
+            <a:endParaRPr lang="en-US" dirty="0">
+              <a:solidFill>
+                <a:schemeClr val="tx1"/>
+              </a:solidFill>
+            </a:endParaRPr>
+          </a:p>
+        </p:txBody>
+      </p:sp>
+      <p:sp>
+        <p:nvSpPr>
+          <p:cNvPr id="3" name="TextBox 2"/>
+          <p:cNvSpPr txBox="1"/>
+          <p:nvPr/>
+        </p:nvSpPr>
+        <p:spPr>
+          <a:xfrm>
+            <a:off x="203130" y="1648288"/>
+            <a:ext cx="8241507" cy="1477328"/>
+          </a:xfrm>
+          <a:prstGeom prst="rect">
+            <a:avLst/>
+          </a:prstGeom>
+          <a:noFill/>
+        </p:spPr>
+        <p:txBody>
+          <a:bodyPr wrap="square" rtlCol="0">
+            <a:spAutoFit/>
+          </a:bodyPr>
+          <a:lstStyle/>
+          <a:p>
+            <a:r>
+              <a:rPr lang="en-US" dirty="0" err="1"/>
+              <a:t>Datadog</a:t>
+            </a:r>
+            <a:r>
+              <a:rPr lang="en-US" dirty="0"/>
+              <a:t> has been used in a lot of creative ways in the past. We’ve written some blog posts about using </a:t>
+            </a:r>
+            <a:r>
+              <a:rPr lang="en-US" dirty="0" err="1"/>
+              <a:t>Datadog</a:t>
+            </a:r>
+            <a:r>
+              <a:rPr lang="en-US" dirty="0"/>
+              <a:t> to monitor the NYC Subway System, </a:t>
+            </a:r>
+            <a:r>
+              <a:rPr lang="en-US" dirty="0" err="1"/>
+              <a:t>Pokemon</a:t>
+            </a:r>
+            <a:r>
+              <a:rPr lang="en-US" dirty="0"/>
+              <a:t> Go, and even office restroom availability!</a:t>
+            </a:r>
+          </a:p>
+          <a:p>
+            <a:endParaRPr lang="en-US" dirty="0"/>
+          </a:p>
+          <a:p>
+            <a:r>
+              <a:rPr lang="en-US" dirty="0"/>
+              <a:t>Is there anything creative you would use </a:t>
+            </a:r>
+            <a:r>
+              <a:rPr lang="en-US" dirty="0" err="1"/>
+              <a:t>Datadog</a:t>
+            </a:r>
+            <a:r>
+              <a:rPr lang="en-US" dirty="0"/>
+              <a:t> for?</a:t>
+            </a:r>
+          </a:p>
+        </p:txBody>
+      </p:sp>
+    </p:spTree>
+    <p:extLst>
+      <p:ext uri="{BB962C8B-B14F-4D97-AF65-F5344CB8AC3E}">
+        <p14:creationId xmlns:p14="http://schemas.microsoft.com/office/powerpoint/2010/main" val="2952515118"/>
+      </p:ext>
+    </p:extLst>
+  </p:cSld>
+  <p:clrMapOvr>
+    <a:masterClrMapping/>
+  </p:clrMapOvr>
+</p:sld>
+</file>
+
+<file path=ppt/slides/slide16.xml><?xml version="1.0" encoding="utf-8"?>
+<p:sld xmlns:a="http://schemas.openxmlformats.org/drawingml/2006/main" xmlns:r="http://schemas.openxmlformats.org/officeDocument/2006/relationships" xmlns:p="http://schemas.openxmlformats.org/presentationml/2006/main">
+  <p:cSld>
+    <p:spTree>
+      <p:nvGrpSpPr>
+        <p:cNvPr id="1" name=""/>
+        <p:cNvGrpSpPr/>
+        <p:nvPr/>
+      </p:nvGrpSpPr>
+      <p:grpSpPr>
+        <a:xfrm>
+          <a:off x="0" y="0"/>
+          <a:ext cx="0" cy="0"/>
+          <a:chOff x="0" y="0"/>
+          <a:chExt cx="0" cy="0"/>
+        </a:xfrm>
+      </p:grpSpPr>
+      <p:sp>
+        <p:nvSpPr>
+          <p:cNvPr id="2" name="Title 1"/>
+          <p:cNvSpPr>
+            <a:spLocks noGrp="1"/>
+          </p:cNvSpPr>
+          <p:nvPr>
+            <p:ph type="title"/>
+          </p:nvPr>
+        </p:nvSpPr>
+        <p:spPr>
+          <a:xfrm>
+            <a:off x="546832" y="153742"/>
+            <a:ext cx="6226829" cy="1143000"/>
+          </a:xfrm>
+        </p:spPr>
+        <p:txBody>
+          <a:bodyPr/>
+          <a:lstStyle/>
+          <a:p>
+            <a:r>
+              <a:rPr lang="en-US" dirty="0" smtClean="0">
+                <a:solidFill>
+                  <a:schemeClr val="tx1"/>
+                </a:solidFill>
+              </a:rPr>
+              <a:t>References</a:t>
+            </a:r>
+            <a:endParaRPr lang="en-US" dirty="0">
+              <a:solidFill>
+                <a:schemeClr val="tx1"/>
+              </a:solidFill>
+            </a:endParaRPr>
+          </a:p>
+        </p:txBody>
+      </p:sp>
+      <p:sp>
+        <p:nvSpPr>
+          <p:cNvPr id="3" name="TextBox 2"/>
+          <p:cNvSpPr txBox="1"/>
+          <p:nvPr/>
+        </p:nvSpPr>
+        <p:spPr>
+          <a:xfrm>
+            <a:off x="220877" y="1296742"/>
+            <a:ext cx="8241507" cy="646331"/>
+          </a:xfrm>
+          <a:prstGeom prst="rect">
+            <a:avLst/>
+          </a:prstGeom>
+          <a:noFill/>
+        </p:spPr>
+        <p:txBody>
+          <a:bodyPr wrap="square" rtlCol="0">
+            <a:spAutoFit/>
+          </a:bodyPr>
+          <a:lstStyle/>
+          <a:p>
+            <a:endParaRPr lang="en-US" dirty="0" smtClean="0"/>
+          </a:p>
+          <a:p>
+            <a:pPr marL="342900" indent="-342900">
+              <a:buFont typeface="+mj-lt"/>
+              <a:buAutoNum type="arabicPeriod"/>
+            </a:pPr>
+            <a:r>
+              <a:rPr lang="en-US" dirty="0" err="1" smtClean="0"/>
+              <a:t>asdf</a:t>
+            </a:r>
+            <a:endParaRPr lang="en-US" dirty="0"/>
+          </a:p>
+        </p:txBody>
+      </p:sp>
+    </p:spTree>
+    <p:extLst>
+      <p:ext uri="{BB962C8B-B14F-4D97-AF65-F5344CB8AC3E}">
+        <p14:creationId xmlns:p14="http://schemas.microsoft.com/office/powerpoint/2010/main" val="530626221"/>
+      </p:ext>
+    </p:extLst>
+  </p:cSld>
+  <p:clrMapOvr>
+    <a:masterClrMapping/>
+  </p:clrMapOvr>
+</p:sld>
+</file>
+
+<file path=ppt/slides/slide17.xml><?xml version="1.0" encoding="utf-8"?>
+<p:sld xmlns:a="http://schemas.openxmlformats.org/drawingml/2006/main" xmlns:r="http://schemas.openxmlformats.org/officeDocument/2006/relationships" xmlns:p="http://schemas.openxmlformats.org/presentationml/2006/main">
+  <p:cSld>
+    <p:spTree>
+      <p:nvGrpSpPr>
+        <p:cNvPr id="1" name=""/>
+        <p:cNvGrpSpPr/>
+        <p:nvPr/>
+      </p:nvGrpSpPr>
+      <p:grpSpPr>
+        <a:xfrm>
+          <a:off x="0" y="0"/>
+          <a:ext cx="0" cy="0"/>
+          <a:chOff x="0" y="0"/>
+          <a:chExt cx="0" cy="0"/>
+        </a:xfrm>
+      </p:grpSpPr>
+      <p:sp>
+        <p:nvSpPr>
+          <p:cNvPr id="2" name="Title 1"/>
+          <p:cNvSpPr>
+            <a:spLocks noGrp="1"/>
+          </p:cNvSpPr>
+          <p:nvPr>
+            <p:ph type="title"/>
+          </p:nvPr>
+        </p:nvSpPr>
+        <p:spPr>
+          <a:xfrm>
+            <a:off x="546832" y="153742"/>
+            <a:ext cx="6226829" cy="1143000"/>
+          </a:xfrm>
+        </p:spPr>
+        <p:txBody>
+          <a:bodyPr/>
+          <a:lstStyle/>
+          <a:p>
+            <a:r>
+              <a:rPr lang="en-US" dirty="0" smtClean="0">
+                <a:solidFill>
+                  <a:schemeClr val="tx1"/>
+                </a:solidFill>
+              </a:rPr>
+              <a:t>GitHub Repos</a:t>
+            </a:r>
+            <a:endParaRPr lang="en-US" dirty="0">
+              <a:solidFill>
+                <a:schemeClr val="tx1"/>
+              </a:solidFill>
+            </a:endParaRPr>
+          </a:p>
+        </p:txBody>
+      </p:sp>
+      <p:sp>
+        <p:nvSpPr>
+          <p:cNvPr id="3" name="TextBox 2"/>
+          <p:cNvSpPr txBox="1"/>
+          <p:nvPr/>
+        </p:nvSpPr>
+        <p:spPr>
+          <a:xfrm>
+            <a:off x="962796" y="1296742"/>
+            <a:ext cx="6923936" cy="646331"/>
+          </a:xfrm>
+          <a:prstGeom prst="rect">
+            <a:avLst/>
+          </a:prstGeom>
+          <a:noFill/>
+        </p:spPr>
+        <p:txBody>
+          <a:bodyPr wrap="square" rtlCol="0">
+            <a:spAutoFit/>
+          </a:bodyPr>
+          <a:lstStyle/>
+          <a:p>
+            <a:pPr marL="342900" indent="-342900">
+              <a:buFont typeface="+mj-lt"/>
+              <a:buAutoNum type="arabicPeriod"/>
+            </a:pPr>
+            <a:r>
+              <a:rPr lang="en-US" dirty="0">
+                <a:hlinkClick r:id="rId2"/>
+              </a:rPr>
+              <a:t>https://github.com/sheltowt/hiring-engineers/tree/</a:t>
+            </a:r>
+            <a:r>
+              <a:rPr lang="en-US" dirty="0" smtClean="0">
+                <a:hlinkClick r:id="rId2"/>
+              </a:rPr>
+              <a:t>bill_shelton</a:t>
+            </a:r>
+            <a:endParaRPr lang="en-US" dirty="0" smtClean="0"/>
+          </a:p>
+          <a:p>
+            <a:pPr marL="342900" indent="-342900">
+              <a:buFont typeface="+mj-lt"/>
+              <a:buAutoNum type="arabicPeriod"/>
+            </a:pPr>
+            <a:endParaRPr lang="en-US" dirty="0"/>
+          </a:p>
+        </p:txBody>
+      </p:sp>
+    </p:spTree>
+    <p:extLst>
+      <p:ext uri="{BB962C8B-B14F-4D97-AF65-F5344CB8AC3E}">
+        <p14:creationId xmlns:p14="http://schemas.microsoft.com/office/powerpoint/2010/main" val="1491958691"/>
+      </p:ext>
+    </p:extLst>
+  </p:cSld>
+  <p:clrMapOvr>
+    <a:masterClrMapping/>
+  </p:clrMapOvr>
+</p:sld>
+</file>
+
 <file path=ppt/slides/slide2.xml><?xml version="1.0" encoding="utf-8"?>
 <p:sld xmlns:a="http://schemas.openxmlformats.org/drawingml/2006/main" xmlns:r="http://schemas.openxmlformats.org/officeDocument/2006/relationships" xmlns:p="http://schemas.openxmlformats.org/presentationml/2006/main">
   <p:cSld>
@@ -3737,7 +4969,7 @@
         <p:spPr>
           <a:xfrm>
             <a:off x="1181300" y="1598972"/>
-            <a:ext cx="6019370" cy="2677656"/>
+            <a:ext cx="6019370" cy="2246769"/>
           </a:xfrm>
           <a:prstGeom prst="rect">
             <a:avLst/>
@@ -3756,13 +4988,8 @@
             </a:pPr>
             <a:r>
               <a:rPr lang="en-US" sz="2800" b="1" dirty="0" smtClean="0"/>
-              <a:t> </a:t>
-            </a:r>
-            <a:r>
-              <a:rPr lang="en-US" sz="2800" b="1" dirty="0" smtClean="0"/>
-              <a:t>Setup the Environment</a:t>
-            </a:r>
-            <a:endParaRPr lang="en-US" sz="2800" b="1" dirty="0" smtClean="0"/>
+              <a:t>Collecting Metrics</a:t>
+            </a:r>
           </a:p>
           <a:p>
             <a:pPr marL="342900" indent="-342900">
@@ -3771,13 +4998,8 @@
             </a:pPr>
             <a:r>
               <a:rPr lang="en-US" sz="2800" b="1" dirty="0" smtClean="0"/>
-              <a:t> </a:t>
-            </a:r>
-            <a:r>
-              <a:rPr lang="en-US" sz="2800" b="1" dirty="0" smtClean="0"/>
-              <a:t>Collecting Metrics</a:t>
-            </a:r>
-            <a:endParaRPr lang="en-US" sz="2800" b="1" dirty="0" smtClean="0"/>
+              <a:t> Visualizing Data</a:t>
+            </a:r>
           </a:p>
           <a:p>
             <a:pPr marL="342900" indent="-342900">
@@ -3786,7 +5008,7 @@
             </a:pPr>
             <a:r>
               <a:rPr lang="en-US" sz="2800" b="1" dirty="0" smtClean="0"/>
-              <a:t> Visualizing Data</a:t>
+              <a:t> Monitoring Data</a:t>
             </a:r>
           </a:p>
           <a:p>
@@ -3796,7 +5018,7 @@
             </a:pPr>
             <a:r>
               <a:rPr lang="en-US" sz="2800" b="1" dirty="0" smtClean="0"/>
-              <a:t> Monitoring Data</a:t>
+              <a:t> Collecting APM Data</a:t>
             </a:r>
           </a:p>
           <a:p>
@@ -3806,17 +5028,7 @@
             </a:pPr>
             <a:r>
               <a:rPr lang="en-US" sz="2800" b="1" dirty="0" smtClean="0"/>
-              <a:t> Collecting APM Data</a:t>
-            </a:r>
-          </a:p>
-          <a:p>
-            <a:pPr marL="342900" indent="-342900">
-              <a:buFont typeface="+mj-lt"/>
-              <a:buAutoNum type="arabicPeriod"/>
-            </a:pPr>
-            <a:r>
-              <a:rPr lang="en-US" sz="2800" b="1" dirty="0" smtClean="0"/>
-              <a:t>What Would You Use </a:t>
+              <a:t> What Would You Use </a:t>
             </a:r>
             <a:r>
               <a:rPr lang="en-US" sz="2800" b="1" dirty="0" err="1" smtClean="0"/>
@@ -3879,8 +5091,8 @@
         </p:nvSpPr>
         <p:spPr>
           <a:xfrm>
-            <a:off x="546832" y="153742"/>
-            <a:ext cx="6226829" cy="1143000"/>
+            <a:off x="546832" y="-124742"/>
+            <a:ext cx="8014594" cy="1143000"/>
           </a:xfrm>
         </p:spPr>
         <p:txBody>
@@ -3893,7 +5105,7 @@
                   <a:schemeClr val="tx1"/>
                 </a:solidFill>
               </a:rPr>
-              <a:t>References</a:t>
+              <a:t>Collecting Metrics</a:t>
             </a:r>
             <a:endParaRPr lang="en-US" dirty="0">
               <a:solidFill>
@@ -3903,47 +5115,40 @@
           </a:p>
         </p:txBody>
       </p:sp>
-      <p:sp>
-        <p:nvSpPr>
-          <p:cNvPr id="3" name="TextBox 2"/>
-          <p:cNvSpPr txBox="1"/>
+      <p:pic>
+        <p:nvPicPr>
+          <p:cNvPr id="4" name="Picture 3" descr="Screen Shot 2020-04-01 at 9.04.28 AM.png"/>
+          <p:cNvPicPr>
+            <a:picLocks noChangeAspect="1"/>
+          </p:cNvPicPr>
           <p:nvPr/>
-        </p:nvSpPr>
-        <p:spPr>
-          <a:xfrm>
-            <a:off x="220877" y="1296742"/>
-            <a:ext cx="8241507" cy="646331"/>
+        </p:nvPicPr>
+        <p:blipFill>
+          <a:blip r:embed="rId2">
+            <a:extLst>
+              <a:ext uri="{28A0092B-C50C-407E-A947-70E740481C1C}">
+                <a14:useLocalDpi xmlns:a14="http://schemas.microsoft.com/office/drawing/2010/main" val="0"/>
+              </a:ext>
+            </a:extLst>
+          </a:blip>
+          <a:stretch>
+            <a:fillRect/>
+          </a:stretch>
+        </p:blipFill>
+        <p:spPr>
+          <a:xfrm>
+            <a:off x="102056" y="1837115"/>
+            <a:ext cx="8232577" cy="3899641"/>
           </a:xfrm>
           <a:prstGeom prst="rect">
             <a:avLst/>
           </a:prstGeom>
-          <a:noFill/>
-        </p:spPr>
-        <p:txBody>
-          <a:bodyPr wrap="square" rtlCol="0">
-            <a:spAutoFit/>
-          </a:bodyPr>
-          <a:lstStyle/>
-          <a:p>
-            <a:endParaRPr lang="en-US" dirty="0" smtClean="0"/>
-          </a:p>
-          <a:p>
-            <a:pPr marL="342900" indent="-342900">
-              <a:buFont typeface="+mj-lt"/>
-              <a:buAutoNum type="arabicPeriod"/>
-            </a:pPr>
-            <a:r>
-              <a:rPr lang="en-US" dirty="0" err="1" smtClean="0"/>
-              <a:t>asdf</a:t>
-            </a:r>
-            <a:endParaRPr lang="en-US" dirty="0"/>
-          </a:p>
-        </p:txBody>
-      </p:sp>
+        </p:spPr>
+      </p:pic>
     </p:spTree>
     <p:extLst>
       <p:ext uri="{BB962C8B-B14F-4D97-AF65-F5344CB8AC3E}">
-        <p14:creationId xmlns:p14="http://schemas.microsoft.com/office/powerpoint/2010/main" val="530626221"/>
+        <p14:creationId xmlns:p14="http://schemas.microsoft.com/office/powerpoint/2010/main" val="2645051163"/>
       </p:ext>
     </p:extLst>
   </p:cSld>
@@ -3982,8 +5187,8 @@
         </p:nvSpPr>
         <p:spPr>
           <a:xfrm>
-            <a:off x="546832" y="153742"/>
-            <a:ext cx="6226829" cy="1143000"/>
+            <a:off x="546832" y="-124742"/>
+            <a:ext cx="8014594" cy="1143000"/>
           </a:xfrm>
         </p:spPr>
         <p:txBody>
@@ -3996,7 +5201,7 @@
                   <a:schemeClr val="tx1"/>
                 </a:solidFill>
               </a:rPr>
-              <a:t>GitHub Repos</a:t>
+              <a:t>Collecting Metrics</a:t>
             </a:r>
             <a:endParaRPr lang="en-US" dirty="0">
               <a:solidFill>
@@ -4006,6 +5211,324 @@
           </a:p>
         </p:txBody>
       </p:sp>
+      <p:pic>
+        <p:nvPicPr>
+          <p:cNvPr id="3" name="Picture 2" descr="Screen Shot 2020-04-01 at 9.11.46 AM.png"/>
+          <p:cNvPicPr>
+            <a:picLocks noChangeAspect="1"/>
+          </p:cNvPicPr>
+          <p:nvPr/>
+        </p:nvPicPr>
+        <p:blipFill>
+          <a:blip r:embed="rId2">
+            <a:extLst>
+              <a:ext uri="{28A0092B-C50C-407E-A947-70E740481C1C}">
+                <a14:useLocalDpi xmlns:a14="http://schemas.microsoft.com/office/drawing/2010/main" val="0"/>
+              </a:ext>
+            </a:extLst>
+          </a:blip>
+          <a:stretch>
+            <a:fillRect/>
+          </a:stretch>
+        </p:blipFill>
+        <p:spPr>
+          <a:xfrm>
+            <a:off x="204112" y="1179383"/>
+            <a:ext cx="8189473" cy="4978358"/>
+          </a:xfrm>
+          <a:prstGeom prst="rect">
+            <a:avLst/>
+          </a:prstGeom>
+        </p:spPr>
+      </p:pic>
+    </p:spTree>
+    <p:extLst>
+      <p:ext uri="{BB962C8B-B14F-4D97-AF65-F5344CB8AC3E}">
+        <p14:creationId xmlns:p14="http://schemas.microsoft.com/office/powerpoint/2010/main" val="2879306031"/>
+      </p:ext>
+    </p:extLst>
+  </p:cSld>
+  <p:clrMapOvr>
+    <a:masterClrMapping/>
+  </p:clrMapOvr>
+</p:sld>
+</file>
+
+<file path=ppt/slides/slide5.xml><?xml version="1.0" encoding="utf-8"?>
+<p:sld xmlns:a="http://schemas.openxmlformats.org/drawingml/2006/main" xmlns:r="http://schemas.openxmlformats.org/officeDocument/2006/relationships" xmlns:p="http://schemas.openxmlformats.org/presentationml/2006/main">
+  <p:cSld>
+    <p:spTree>
+      <p:nvGrpSpPr>
+        <p:cNvPr id="1" name=""/>
+        <p:cNvGrpSpPr/>
+        <p:nvPr/>
+      </p:nvGrpSpPr>
+      <p:grpSpPr>
+        <a:xfrm>
+          <a:off x="0" y="0"/>
+          <a:ext cx="0" cy="0"/>
+          <a:chOff x="0" y="0"/>
+          <a:chExt cx="0" cy="0"/>
+        </a:xfrm>
+      </p:grpSpPr>
+      <p:sp>
+        <p:nvSpPr>
+          <p:cNvPr id="2" name="Title 1"/>
+          <p:cNvSpPr>
+            <a:spLocks noGrp="1"/>
+          </p:cNvSpPr>
+          <p:nvPr>
+            <p:ph type="title"/>
+          </p:nvPr>
+        </p:nvSpPr>
+        <p:spPr>
+          <a:xfrm>
+            <a:off x="546832" y="-124742"/>
+            <a:ext cx="8014594" cy="1143000"/>
+          </a:xfrm>
+        </p:spPr>
+        <p:txBody>
+          <a:bodyPr/>
+          <a:lstStyle/>
+          <a:p>
+            <a:r>
+              <a:rPr lang="en-US" dirty="0" smtClean="0">
+                <a:solidFill>
+                  <a:schemeClr val="tx1"/>
+                </a:solidFill>
+              </a:rPr>
+              <a:t>Collecting Metrics</a:t>
+            </a:r>
+            <a:endParaRPr lang="en-US" dirty="0">
+              <a:solidFill>
+                <a:schemeClr val="tx1"/>
+              </a:solidFill>
+            </a:endParaRPr>
+          </a:p>
+        </p:txBody>
+      </p:sp>
+      <p:pic>
+        <p:nvPicPr>
+          <p:cNvPr id="3" name="Picture 2" descr="Screen Shot 2020-04-01 at 9.07.17 AM.png"/>
+          <p:cNvPicPr>
+            <a:picLocks noChangeAspect="1"/>
+          </p:cNvPicPr>
+          <p:nvPr/>
+        </p:nvPicPr>
+        <p:blipFill>
+          <a:blip r:embed="rId2">
+            <a:extLst>
+              <a:ext uri="{28A0092B-C50C-407E-A947-70E740481C1C}">
+                <a14:useLocalDpi xmlns:a14="http://schemas.microsoft.com/office/drawing/2010/main" val="0"/>
+              </a:ext>
+            </a:extLst>
+          </a:blip>
+          <a:stretch>
+            <a:fillRect/>
+          </a:stretch>
+        </p:blipFill>
+        <p:spPr>
+          <a:xfrm>
+            <a:off x="226793" y="1258765"/>
+            <a:ext cx="7861897" cy="4254674"/>
+          </a:xfrm>
+          <a:prstGeom prst="rect">
+            <a:avLst/>
+          </a:prstGeom>
+        </p:spPr>
+      </p:pic>
+    </p:spTree>
+    <p:extLst>
+      <p:ext uri="{BB962C8B-B14F-4D97-AF65-F5344CB8AC3E}">
+        <p14:creationId xmlns:p14="http://schemas.microsoft.com/office/powerpoint/2010/main" val="494471336"/>
+      </p:ext>
+    </p:extLst>
+  </p:cSld>
+  <p:clrMapOvr>
+    <a:masterClrMapping/>
+  </p:clrMapOvr>
+</p:sld>
+</file>
+
+<file path=ppt/slides/slide6.xml><?xml version="1.0" encoding="utf-8"?>
+<p:sld xmlns:a="http://schemas.openxmlformats.org/drawingml/2006/main" xmlns:r="http://schemas.openxmlformats.org/officeDocument/2006/relationships" xmlns:p="http://schemas.openxmlformats.org/presentationml/2006/main">
+  <p:cSld>
+    <p:spTree>
+      <p:nvGrpSpPr>
+        <p:cNvPr id="1" name=""/>
+        <p:cNvGrpSpPr/>
+        <p:nvPr/>
+      </p:nvGrpSpPr>
+      <p:grpSpPr>
+        <a:xfrm>
+          <a:off x="0" y="0"/>
+          <a:ext cx="0" cy="0"/>
+          <a:chOff x="0" y="0"/>
+          <a:chExt cx="0" cy="0"/>
+        </a:xfrm>
+      </p:grpSpPr>
+      <p:sp>
+        <p:nvSpPr>
+          <p:cNvPr id="2" name="Title 1"/>
+          <p:cNvSpPr>
+            <a:spLocks noGrp="1"/>
+          </p:cNvSpPr>
+          <p:nvPr>
+            <p:ph type="title"/>
+          </p:nvPr>
+        </p:nvSpPr>
+        <p:spPr>
+          <a:xfrm>
+            <a:off x="546832" y="-124742"/>
+            <a:ext cx="8014594" cy="1143000"/>
+          </a:xfrm>
+        </p:spPr>
+        <p:txBody>
+          <a:bodyPr/>
+          <a:lstStyle/>
+          <a:p>
+            <a:r>
+              <a:rPr lang="en-US" dirty="0" smtClean="0">
+                <a:solidFill>
+                  <a:schemeClr val="tx1"/>
+                </a:solidFill>
+              </a:rPr>
+              <a:t>Collecting Metrics</a:t>
+            </a:r>
+            <a:endParaRPr lang="en-US" dirty="0">
+              <a:solidFill>
+                <a:schemeClr val="tx1"/>
+              </a:solidFill>
+            </a:endParaRPr>
+          </a:p>
+        </p:txBody>
+      </p:sp>
+      <p:pic>
+        <p:nvPicPr>
+          <p:cNvPr id="4" name="Picture 3" descr="Screen Shot 2020-04-01 at 9.09.35 AM.png"/>
+          <p:cNvPicPr>
+            <a:picLocks noChangeAspect="1"/>
+          </p:cNvPicPr>
+          <p:nvPr/>
+        </p:nvPicPr>
+        <p:blipFill>
+          <a:blip r:embed="rId2">
+            <a:extLst>
+              <a:ext uri="{28A0092B-C50C-407E-A947-70E740481C1C}">
+                <a14:useLocalDpi xmlns:a14="http://schemas.microsoft.com/office/drawing/2010/main" val="0"/>
+              </a:ext>
+            </a:extLst>
+          </a:blip>
+          <a:stretch>
+            <a:fillRect/>
+          </a:stretch>
+        </p:blipFill>
+        <p:spPr>
+          <a:xfrm>
+            <a:off x="1124986" y="904855"/>
+            <a:ext cx="6096000" cy="3149600"/>
+          </a:xfrm>
+          <a:prstGeom prst="rect">
+            <a:avLst/>
+          </a:prstGeom>
+        </p:spPr>
+      </p:pic>
+      <p:pic>
+        <p:nvPicPr>
+          <p:cNvPr id="5" name="Picture 4" descr="Screen Shot 2020-04-01 at 9.09.44 AM.png"/>
+          <p:cNvPicPr>
+            <a:picLocks noChangeAspect="1"/>
+          </p:cNvPicPr>
+          <p:nvPr/>
+        </p:nvPicPr>
+        <p:blipFill>
+          <a:blip r:embed="rId3">
+            <a:extLst>
+              <a:ext uri="{28A0092B-C50C-407E-A947-70E740481C1C}">
+                <a14:useLocalDpi xmlns:a14="http://schemas.microsoft.com/office/drawing/2010/main" val="0"/>
+              </a:ext>
+            </a:extLst>
+          </a:blip>
+          <a:stretch>
+            <a:fillRect/>
+          </a:stretch>
+        </p:blipFill>
+        <p:spPr>
+          <a:xfrm>
+            <a:off x="2084288" y="4357919"/>
+            <a:ext cx="4064000" cy="2374900"/>
+          </a:xfrm>
+          <a:prstGeom prst="rect">
+            <a:avLst/>
+          </a:prstGeom>
+        </p:spPr>
+      </p:pic>
+    </p:spTree>
+    <p:extLst>
+      <p:ext uri="{BB962C8B-B14F-4D97-AF65-F5344CB8AC3E}">
+        <p14:creationId xmlns:p14="http://schemas.microsoft.com/office/powerpoint/2010/main" val="1805985270"/>
+      </p:ext>
+    </p:extLst>
+  </p:cSld>
+  <p:clrMapOvr>
+    <a:masterClrMapping/>
+  </p:clrMapOvr>
+</p:sld>
+</file>
+
+<file path=ppt/slides/slide7.xml><?xml version="1.0" encoding="utf-8"?>
+<p:sld xmlns:a="http://schemas.openxmlformats.org/drawingml/2006/main" xmlns:r="http://schemas.openxmlformats.org/officeDocument/2006/relationships" xmlns:p="http://schemas.openxmlformats.org/presentationml/2006/main">
+  <p:cSld>
+    <p:spTree>
+      <p:nvGrpSpPr>
+        <p:cNvPr id="1" name=""/>
+        <p:cNvGrpSpPr/>
+        <p:nvPr/>
+      </p:nvGrpSpPr>
+      <p:grpSpPr>
+        <a:xfrm>
+          <a:off x="0" y="0"/>
+          <a:ext cx="0" cy="0"/>
+          <a:chOff x="0" y="0"/>
+          <a:chExt cx="0" cy="0"/>
+        </a:xfrm>
+      </p:grpSpPr>
+      <p:sp>
+        <p:nvSpPr>
+          <p:cNvPr id="2" name="Title 1"/>
+          <p:cNvSpPr>
+            <a:spLocks noGrp="1"/>
+          </p:cNvSpPr>
+          <p:nvPr>
+            <p:ph type="title"/>
+          </p:nvPr>
+        </p:nvSpPr>
+        <p:spPr>
+          <a:xfrm>
+            <a:off x="546832" y="-124742"/>
+            <a:ext cx="8014594" cy="1143000"/>
+          </a:xfrm>
+        </p:spPr>
+        <p:txBody>
+          <a:bodyPr/>
+          <a:lstStyle/>
+          <a:p>
+            <a:r>
+              <a:rPr lang="en-US" dirty="0" smtClean="0">
+                <a:solidFill>
+                  <a:schemeClr val="tx1"/>
+                </a:solidFill>
+              </a:rPr>
+              <a:t>Visualizing Data</a:t>
+            </a:r>
+            <a:endParaRPr lang="en-US" dirty="0">
+              <a:solidFill>
+                <a:schemeClr val="tx1"/>
+              </a:solidFill>
+            </a:endParaRPr>
+          </a:p>
+        </p:txBody>
+      </p:sp>
       <p:sp>
         <p:nvSpPr>
           <p:cNvPr id="3" name="TextBox 2"/>
@@ -4014,8 +5537,8 @@
         </p:nvSpPr>
         <p:spPr>
           <a:xfrm>
-            <a:off x="962796" y="1296742"/>
-            <a:ext cx="6923936" cy="646331"/>
+            <a:off x="220877" y="1115299"/>
+            <a:ext cx="8241507" cy="4524316"/>
           </a:xfrm>
           <a:prstGeom prst="rect">
             <a:avLst/>
@@ -4028,37 +5551,331 @@
           </a:bodyPr>
           <a:lstStyle/>
           <a:p>
-            <a:pPr marL="342900" indent="-342900">
-              <a:buFont typeface="+mj-lt"/>
-              <a:buAutoNum type="arabicPeriod"/>
-            </a:pPr>
-            <a:r>
-              <a:rPr lang="en-US" dirty="0">
-                <a:hlinkClick r:id="rId2"/>
-              </a:rPr>
-              <a:t>https://github.com/sheltowt/hiring-engineers/tree/</a:t>
-            </a:r>
-            <a:r>
-              <a:rPr lang="en-US" dirty="0" smtClean="0">
-                <a:hlinkClick r:id="rId2"/>
-              </a:rPr>
-              <a:t>bill_shelton</a:t>
-            </a:r>
-            <a:endParaRPr lang="en-US" dirty="0" smtClean="0"/>
-          </a:p>
-          <a:p>
-            <a:pPr marL="342900" indent="-342900">
-              <a:buFont typeface="+mj-lt"/>
-              <a:buAutoNum type="arabicPeriod"/>
-            </a:pPr>
+            <a:r>
+              <a:rPr lang="en-US" dirty="0"/>
+              <a:t>Utilize the </a:t>
+            </a:r>
+            <a:r>
+              <a:rPr lang="en-US" dirty="0" err="1"/>
+              <a:t>Datadog</a:t>
+            </a:r>
+            <a:r>
+              <a:rPr lang="en-US" dirty="0"/>
+              <a:t> API to create a </a:t>
+            </a:r>
+            <a:r>
+              <a:rPr lang="en-US" dirty="0" err="1"/>
+              <a:t>Timeboard</a:t>
+            </a:r>
+            <a:r>
+              <a:rPr lang="en-US" dirty="0"/>
+              <a:t> that contains:</a:t>
+            </a:r>
+          </a:p>
+          <a:p>
             <a:endParaRPr lang="en-US" dirty="0"/>
+          </a:p>
+          <a:p>
+            <a:r>
+              <a:rPr lang="en-US" dirty="0"/>
+              <a:t>* Your custom metric scoped over your host.</a:t>
+            </a:r>
+          </a:p>
+          <a:p>
+            <a:r>
+              <a:rPr lang="en-US" dirty="0"/>
+              <a:t>* Any metric from the Integration on your Database with the anomaly function applied.</a:t>
+            </a:r>
+          </a:p>
+          <a:p>
+            <a:r>
+              <a:rPr lang="en-US" dirty="0"/>
+              <a:t>* Your custom metric with the rollup function applied to sum up all the points for the past hour into one bucket</a:t>
+            </a:r>
+          </a:p>
+          <a:p>
+            <a:endParaRPr lang="en-US" dirty="0"/>
+          </a:p>
+          <a:p>
+            <a:r>
+              <a:rPr lang="en-US" dirty="0"/>
+              <a:t>Please be sure, when submitting your hiring challenge, to include the script that you've used to create this </a:t>
+            </a:r>
+            <a:r>
+              <a:rPr lang="en-US" dirty="0" err="1"/>
+              <a:t>Timeboard</a:t>
+            </a:r>
+            <a:r>
+              <a:rPr lang="en-US" dirty="0"/>
+              <a:t>.</a:t>
+            </a:r>
+          </a:p>
+          <a:p>
+            <a:endParaRPr lang="en-US" dirty="0"/>
+          </a:p>
+          <a:p>
+            <a:r>
+              <a:rPr lang="en-US" dirty="0"/>
+              <a:t>Once this is created, access the Dashboard from your Dashboard List in the UI:</a:t>
+            </a:r>
+          </a:p>
+          <a:p>
+            <a:endParaRPr lang="en-US" dirty="0"/>
+          </a:p>
+          <a:p>
+            <a:r>
+              <a:rPr lang="en-US" dirty="0"/>
+              <a:t>* Set the </a:t>
+            </a:r>
+            <a:r>
+              <a:rPr lang="en-US" dirty="0" err="1"/>
+              <a:t>Timeboard's</a:t>
+            </a:r>
+            <a:r>
+              <a:rPr lang="en-US" dirty="0"/>
+              <a:t> timeframe to the past 5 minutes</a:t>
+            </a:r>
+          </a:p>
+          <a:p>
+            <a:r>
+              <a:rPr lang="en-US" dirty="0"/>
+              <a:t>* Take a snapshot of this graph and use the @ notation to send it to yourself.</a:t>
+            </a:r>
+          </a:p>
+          <a:p>
+            <a:r>
+              <a:rPr lang="en-US" dirty="0"/>
+              <a:t>* **Bonus Question**: What is the Anomaly graph displaying?</a:t>
+            </a:r>
           </a:p>
         </p:txBody>
       </p:sp>
     </p:spTree>
     <p:extLst>
       <p:ext uri="{BB962C8B-B14F-4D97-AF65-F5344CB8AC3E}">
-        <p14:creationId xmlns:p14="http://schemas.microsoft.com/office/powerpoint/2010/main" val="1491958691"/>
+        <p14:creationId xmlns:p14="http://schemas.microsoft.com/office/powerpoint/2010/main" val="3043120717"/>
+      </p:ext>
+    </p:extLst>
+  </p:cSld>
+  <p:clrMapOvr>
+    <a:masterClrMapping/>
+  </p:clrMapOvr>
+</p:sld>
+</file>
+
+<file path=ppt/slides/slide8.xml><?xml version="1.0" encoding="utf-8"?>
+<p:sld xmlns:a="http://schemas.openxmlformats.org/drawingml/2006/main" xmlns:r="http://schemas.openxmlformats.org/officeDocument/2006/relationships" xmlns:p="http://schemas.openxmlformats.org/presentationml/2006/main">
+  <p:cSld>
+    <p:spTree>
+      <p:nvGrpSpPr>
+        <p:cNvPr id="1" name=""/>
+        <p:cNvGrpSpPr/>
+        <p:nvPr/>
+      </p:nvGrpSpPr>
+      <p:grpSpPr>
+        <a:xfrm>
+          <a:off x="0" y="0"/>
+          <a:ext cx="0" cy="0"/>
+          <a:chOff x="0" y="0"/>
+          <a:chExt cx="0" cy="0"/>
+        </a:xfrm>
+      </p:grpSpPr>
+      <p:sp>
+        <p:nvSpPr>
+          <p:cNvPr id="2" name="Title 1"/>
+          <p:cNvSpPr>
+            <a:spLocks noGrp="1"/>
+          </p:cNvSpPr>
+          <p:nvPr>
+            <p:ph type="title"/>
+          </p:nvPr>
+        </p:nvSpPr>
+        <p:spPr>
+          <a:xfrm>
+            <a:off x="546832" y="-124742"/>
+            <a:ext cx="8014594" cy="1143000"/>
+          </a:xfrm>
+        </p:spPr>
+        <p:txBody>
+          <a:bodyPr/>
+          <a:lstStyle/>
+          <a:p>
+            <a:r>
+              <a:rPr lang="en-US" dirty="0" smtClean="0">
+                <a:solidFill>
+                  <a:schemeClr val="tx1"/>
+                </a:solidFill>
+              </a:rPr>
+              <a:t>Visualizing Data</a:t>
+            </a:r>
+            <a:endParaRPr lang="en-US" dirty="0">
+              <a:solidFill>
+                <a:schemeClr val="tx1"/>
+              </a:solidFill>
+            </a:endParaRPr>
+          </a:p>
+        </p:txBody>
+      </p:sp>
+      <p:pic>
+        <p:nvPicPr>
+          <p:cNvPr id="4" name="Picture 3" descr="Screen Shot 2020-04-01 at 9.17.40 AM.png"/>
+          <p:cNvPicPr>
+            <a:picLocks noChangeAspect="1"/>
+          </p:cNvPicPr>
+          <p:nvPr/>
+        </p:nvPicPr>
+        <p:blipFill>
+          <a:blip r:embed="rId2">
+            <a:extLst>
+              <a:ext uri="{28A0092B-C50C-407E-A947-70E740481C1C}">
+                <a14:useLocalDpi xmlns:a14="http://schemas.microsoft.com/office/drawing/2010/main" val="0"/>
+              </a:ext>
+            </a:extLst>
+          </a:blip>
+          <a:stretch>
+            <a:fillRect/>
+          </a:stretch>
+        </p:blipFill>
+        <p:spPr>
+          <a:xfrm>
+            <a:off x="1681512" y="1018258"/>
+            <a:ext cx="4462705" cy="5236349"/>
+          </a:xfrm>
+          <a:prstGeom prst="rect">
+            <a:avLst/>
+          </a:prstGeom>
+        </p:spPr>
+      </p:pic>
+    </p:spTree>
+    <p:extLst>
+      <p:ext uri="{BB962C8B-B14F-4D97-AF65-F5344CB8AC3E}">
+        <p14:creationId xmlns:p14="http://schemas.microsoft.com/office/powerpoint/2010/main" val="1729009654"/>
+      </p:ext>
+    </p:extLst>
+  </p:cSld>
+  <p:clrMapOvr>
+    <a:masterClrMapping/>
+  </p:clrMapOvr>
+</p:sld>
+</file>
+
+<file path=ppt/slides/slide9.xml><?xml version="1.0" encoding="utf-8"?>
+<p:sld xmlns:a="http://schemas.openxmlformats.org/drawingml/2006/main" xmlns:r="http://schemas.openxmlformats.org/officeDocument/2006/relationships" xmlns:p="http://schemas.openxmlformats.org/presentationml/2006/main">
+  <p:cSld>
+    <p:spTree>
+      <p:nvGrpSpPr>
+        <p:cNvPr id="1" name=""/>
+        <p:cNvGrpSpPr/>
+        <p:nvPr/>
+      </p:nvGrpSpPr>
+      <p:grpSpPr>
+        <a:xfrm>
+          <a:off x="0" y="0"/>
+          <a:ext cx="0" cy="0"/>
+          <a:chOff x="0" y="0"/>
+          <a:chExt cx="0" cy="0"/>
+        </a:xfrm>
+      </p:grpSpPr>
+      <p:sp>
+        <p:nvSpPr>
+          <p:cNvPr id="2" name="Title 1"/>
+          <p:cNvSpPr>
+            <a:spLocks noGrp="1"/>
+          </p:cNvSpPr>
+          <p:nvPr>
+            <p:ph type="title"/>
+          </p:nvPr>
+        </p:nvSpPr>
+        <p:spPr>
+          <a:xfrm>
+            <a:off x="546832" y="-124742"/>
+            <a:ext cx="8014594" cy="1143000"/>
+          </a:xfrm>
+        </p:spPr>
+        <p:txBody>
+          <a:bodyPr/>
+          <a:lstStyle/>
+          <a:p>
+            <a:r>
+              <a:rPr lang="en-US" dirty="0" smtClean="0">
+                <a:solidFill>
+                  <a:schemeClr val="tx1"/>
+                </a:solidFill>
+              </a:rPr>
+              <a:t>Visualizing Data</a:t>
+            </a:r>
+            <a:endParaRPr lang="en-US" dirty="0">
+              <a:solidFill>
+                <a:schemeClr val="tx1"/>
+              </a:solidFill>
+            </a:endParaRPr>
+          </a:p>
+        </p:txBody>
+      </p:sp>
+      <p:pic>
+        <p:nvPicPr>
+          <p:cNvPr id="5" name="Picture 4" descr="Screen Shot 2020-04-01 at 9.19.10 AM.png"/>
+          <p:cNvPicPr>
+            <a:picLocks noChangeAspect="1"/>
+          </p:cNvPicPr>
+          <p:nvPr/>
+        </p:nvPicPr>
+        <p:blipFill>
+          <a:blip r:embed="rId2">
+            <a:extLst>
+              <a:ext uri="{28A0092B-C50C-407E-A947-70E740481C1C}">
+                <a14:useLocalDpi xmlns:a14="http://schemas.microsoft.com/office/drawing/2010/main" val="0"/>
+              </a:ext>
+            </a:extLst>
+          </a:blip>
+          <a:stretch>
+            <a:fillRect/>
+          </a:stretch>
+        </p:blipFill>
+        <p:spPr>
+          <a:xfrm>
+            <a:off x="0" y="1018258"/>
+            <a:ext cx="8401793" cy="4621372"/>
+          </a:xfrm>
+          <a:prstGeom prst="rect">
+            <a:avLst/>
+          </a:prstGeom>
+        </p:spPr>
+      </p:pic>
+      <p:sp>
+        <p:nvSpPr>
+          <p:cNvPr id="6" name="TextBox 5"/>
+          <p:cNvSpPr txBox="1"/>
+          <p:nvPr/>
+        </p:nvSpPr>
+        <p:spPr>
+          <a:xfrm>
+            <a:off x="170095" y="5817535"/>
+            <a:ext cx="8231698" cy="369332"/>
+          </a:xfrm>
+          <a:prstGeom prst="rect">
+            <a:avLst/>
+          </a:prstGeom>
+          <a:noFill/>
+        </p:spPr>
+        <p:txBody>
+          <a:bodyPr wrap="square" rtlCol="0">
+            <a:spAutoFit/>
+          </a:bodyPr>
+          <a:lstStyle/>
+          <a:p>
+            <a:r>
+              <a:rPr lang="en-US" dirty="0" smtClean="0"/>
+              <a:t>What is the anomaly graph displaying?</a:t>
+            </a:r>
+            <a:endParaRPr lang="en-US" dirty="0"/>
+          </a:p>
+        </p:txBody>
+      </p:sp>
+    </p:spTree>
+    <p:extLst>
+      <p:ext uri="{BB962C8B-B14F-4D97-AF65-F5344CB8AC3E}">
+        <p14:creationId xmlns:p14="http://schemas.microsoft.com/office/powerpoint/2010/main" val="1683883774"/>
       </p:ext>
     </p:extLst>
   </p:cSld>

</xml_diff>

<commit_message>
addding updated powerpoint document
</commit_message>
<xml_diff>
--- a/report/datadog_billshelton.pptx
+++ b/report/datadog_billshelton.pptx
@@ -12,18 +12,18 @@
     <p:sldId id="257" r:id="rId3"/>
     <p:sldId id="276" r:id="rId4"/>
     <p:sldId id="279" r:id="rId5"/>
-    <p:sldId id="277" r:id="rId6"/>
-    <p:sldId id="278" r:id="rId7"/>
-    <p:sldId id="272" r:id="rId8"/>
-    <p:sldId id="280" r:id="rId9"/>
-    <p:sldId id="281" r:id="rId10"/>
-    <p:sldId id="273" r:id="rId11"/>
-    <p:sldId id="282" r:id="rId12"/>
-    <p:sldId id="274" r:id="rId13"/>
-    <p:sldId id="283" r:id="rId14"/>
-    <p:sldId id="284" r:id="rId15"/>
-    <p:sldId id="275" r:id="rId16"/>
-    <p:sldId id="268" r:id="rId17"/>
+    <p:sldId id="278" r:id="rId6"/>
+    <p:sldId id="277" r:id="rId7"/>
+    <p:sldId id="280" r:id="rId8"/>
+    <p:sldId id="281" r:id="rId9"/>
+    <p:sldId id="288" r:id="rId10"/>
+    <p:sldId id="282" r:id="rId11"/>
+    <p:sldId id="287" r:id="rId12"/>
+    <p:sldId id="283" r:id="rId13"/>
+    <p:sldId id="284" r:id="rId14"/>
+    <p:sldId id="275" r:id="rId15"/>
+    <p:sldId id="285" r:id="rId16"/>
+    <p:sldId id="286" r:id="rId17"/>
     <p:sldId id="269" r:id="rId18"/>
   </p:sldIdLst>
   <p:sldSz cx="9144000" cy="6858000" type="screen4x3"/>
@@ -3741,16 +3741,76 @@
           </a:p>
         </p:txBody>
       </p:sp>
-      <p:sp>
-        <p:nvSpPr>
-          <p:cNvPr id="3" name="TextBox 2"/>
+      <p:pic>
+        <p:nvPicPr>
+          <p:cNvPr id="5" name="Picture 4" descr="Screen Shot 2020-04-01 at 12.16.44 PM.png"/>
+          <p:cNvPicPr>
+            <a:picLocks noChangeAspect="1"/>
+          </p:cNvPicPr>
+          <p:nvPr/>
+        </p:nvPicPr>
+        <p:blipFill>
+          <a:blip r:embed="rId2">
+            <a:extLst>
+              <a:ext uri="{28A0092B-C50C-407E-A947-70E740481C1C}">
+                <a14:useLocalDpi xmlns:a14="http://schemas.microsoft.com/office/drawing/2010/main" val="0"/>
+              </a:ext>
+            </a:extLst>
+          </a:blip>
+          <a:stretch>
+            <a:fillRect/>
+          </a:stretch>
+        </p:blipFill>
+        <p:spPr>
+          <a:xfrm>
+            <a:off x="873151" y="1274833"/>
+            <a:ext cx="7268707" cy="1877749"/>
+          </a:xfrm>
+          <a:prstGeom prst="rect">
+            <a:avLst/>
+          </a:prstGeom>
+        </p:spPr>
+      </p:pic>
+      <p:pic>
+        <p:nvPicPr>
+          <p:cNvPr id="6" name="Picture 5" descr="Screen Shot 2020-04-01 at 12.17.15 PM.png"/>
+          <p:cNvPicPr>
+            <a:picLocks noChangeAspect="1"/>
+          </p:cNvPicPr>
+          <p:nvPr/>
+        </p:nvPicPr>
+        <p:blipFill>
+          <a:blip r:embed="rId3">
+            <a:extLst>
+              <a:ext uri="{28A0092B-C50C-407E-A947-70E740481C1C}">
+                <a14:useLocalDpi xmlns:a14="http://schemas.microsoft.com/office/drawing/2010/main" val="0"/>
+              </a:ext>
+            </a:extLst>
+          </a:blip>
+          <a:stretch>
+            <a:fillRect/>
+          </a:stretch>
+        </p:blipFill>
+        <p:spPr>
+          <a:xfrm>
+            <a:off x="489259" y="3152582"/>
+            <a:ext cx="7754656" cy="3232812"/>
+          </a:xfrm>
+          <a:prstGeom prst="rect">
+            <a:avLst/>
+          </a:prstGeom>
+        </p:spPr>
+      </p:pic>
+      <p:sp>
+        <p:nvSpPr>
+          <p:cNvPr id="7" name="TextBox 6"/>
           <p:cNvSpPr txBox="1"/>
           <p:nvPr/>
         </p:nvSpPr>
         <p:spPr>
           <a:xfrm>
-            <a:off x="192282" y="820452"/>
-            <a:ext cx="8241507" cy="8679298"/>
+            <a:off x="317510" y="918558"/>
+            <a:ext cx="7926405" cy="369332"/>
           </a:xfrm>
           <a:prstGeom prst="rect">
             <a:avLst/>
@@ -3764,151 +3824,17 @@
           <a:lstStyle/>
           <a:p>
             <a:r>
-              <a:rPr lang="en-US" dirty="0"/>
-              <a:t>Since you’ve already caught your test metric going above 800 once, you don’t want to have to continually watch this dashboard to be alerted when it goes above 800 again. So let’s make life easier by creating a monitor.</a:t>
-            </a:r>
-          </a:p>
-          <a:p>
+              <a:rPr lang="en-US" dirty="0" smtClean="0"/>
+              <a:t>The images below show the configuration of the thresholds and email templates.</a:t>
+            </a:r>
             <a:endParaRPr lang="en-US" dirty="0"/>
-          </a:p>
-          <a:p>
-            <a:r>
-              <a:rPr lang="en-US" dirty="0"/>
-              <a:t>Create a new Metric Monitor that watches the average of your custom metric (</a:t>
-            </a:r>
-            <a:r>
-              <a:rPr lang="en-US" dirty="0" err="1"/>
-              <a:t>my_metric</a:t>
-            </a:r>
-            <a:r>
-              <a:rPr lang="en-US" dirty="0"/>
-              <a:t>) and will alert if it’s above the following values over the past 5 minutes:</a:t>
-            </a:r>
-          </a:p>
-          <a:p>
-            <a:endParaRPr lang="en-US" dirty="0"/>
-          </a:p>
-          <a:p>
-            <a:r>
-              <a:rPr lang="en-US" dirty="0"/>
-              <a:t>* Warning threshold of 500</a:t>
-            </a:r>
-          </a:p>
-          <a:p>
-            <a:r>
-              <a:rPr lang="en-US" dirty="0"/>
-              <a:t>* Alerting threshold of 800</a:t>
-            </a:r>
-          </a:p>
-          <a:p>
-            <a:pPr marL="285750" indent="-285750">
-              <a:buFontTx/>
-              <a:buChar char="•"/>
-            </a:pPr>
-            <a:r>
-              <a:rPr lang="en-US" dirty="0" smtClean="0"/>
-              <a:t>And </a:t>
-            </a:r>
-            <a:r>
-              <a:rPr lang="en-US" dirty="0"/>
-              <a:t>also ensure that it will notify you if there is No Data for this query over the past 10m</a:t>
-            </a:r>
-            <a:r>
-              <a:rPr lang="en-US" dirty="0" smtClean="0"/>
-              <a:t>.</a:t>
-            </a:r>
-          </a:p>
-          <a:p>
-            <a:pPr marL="285750" indent="-285750">
-              <a:buFontTx/>
-              <a:buChar char="•"/>
-            </a:pPr>
-            <a:endParaRPr lang="en-US" dirty="0"/>
-          </a:p>
-          <a:p>
-            <a:pPr marL="285750" indent="-285750">
-              <a:buFontTx/>
-              <a:buChar char="•"/>
-            </a:pPr>
-            <a:endParaRPr lang="en-US" dirty="0" smtClean="0"/>
-          </a:p>
-          <a:p>
-            <a:r>
-              <a:rPr lang="en-US" dirty="0"/>
-              <a:t>Please configure the monitor’s message so that it will:</a:t>
-            </a:r>
-          </a:p>
-          <a:p>
-            <a:endParaRPr lang="en-US" dirty="0"/>
-          </a:p>
-          <a:p>
-            <a:r>
-              <a:rPr lang="en-US" dirty="0"/>
-              <a:t>* Send you an email whenever the monitor triggers.</a:t>
-            </a:r>
-          </a:p>
-          <a:p>
-            <a:r>
-              <a:rPr lang="en-US" dirty="0"/>
-              <a:t>* Create different messages based on whether the monitor is in an Alert, Warning, or No Data state.</a:t>
-            </a:r>
-          </a:p>
-          <a:p>
-            <a:r>
-              <a:rPr lang="en-US" dirty="0"/>
-              <a:t>* Include the metric value that caused the monitor to trigger and host </a:t>
-            </a:r>
-            <a:r>
-              <a:rPr lang="en-US" dirty="0" err="1"/>
-              <a:t>ip</a:t>
-            </a:r>
-            <a:r>
-              <a:rPr lang="en-US" dirty="0"/>
-              <a:t> when the Monitor triggers an Alert state.</a:t>
-            </a:r>
-          </a:p>
-          <a:p>
-            <a:r>
-              <a:rPr lang="en-US" dirty="0"/>
-              <a:t>* When this monitor sends you an email notification, take a screenshot of the email that it sends you.</a:t>
-            </a:r>
-          </a:p>
-          <a:p>
-            <a:endParaRPr lang="en-US" dirty="0"/>
-          </a:p>
-          <a:p>
-            <a:r>
-              <a:rPr lang="en-US" dirty="0"/>
-              <a:t>* **Bonus Question**: Since this monitor is going to alert pretty often, you don’t want to be alerted when you are out of the office. Set up two scheduled downtimes for this monitor:</a:t>
-            </a:r>
-          </a:p>
-          <a:p>
-            <a:endParaRPr lang="en-US" dirty="0"/>
-          </a:p>
-          <a:p>
-            <a:r>
-              <a:rPr lang="en-US" dirty="0"/>
-              <a:t>  * One that silences it from 7pm to 9am daily on M-F,</a:t>
-            </a:r>
-          </a:p>
-          <a:p>
-            <a:r>
-              <a:rPr lang="en-US" dirty="0"/>
-              <a:t>  * And one that silences it all day on Sat-Sun.</a:t>
-            </a:r>
-          </a:p>
-          <a:p>
-            <a:r>
-              <a:rPr lang="en-US" dirty="0"/>
-              <a:t>  * Make sure that your email is notified when you schedule the downtime and take a screenshot of that notification.</a:t>
-            </a:r>
           </a:p>
         </p:txBody>
       </p:sp>
     </p:spTree>
     <p:extLst>
       <p:ext uri="{BB962C8B-B14F-4D97-AF65-F5344CB8AC3E}">
-        <p14:creationId xmlns:p14="http://schemas.microsoft.com/office/powerpoint/2010/main" val="1535764977"/>
+        <p14:creationId xmlns:p14="http://schemas.microsoft.com/office/powerpoint/2010/main" val="660703615"/>
       </p:ext>
     </p:extLst>
   </p:cSld>
@@ -3971,16 +3897,46 @@
           </a:p>
         </p:txBody>
       </p:sp>
-      <p:sp>
-        <p:nvSpPr>
-          <p:cNvPr id="3" name="TextBox 2"/>
+      <p:pic>
+        <p:nvPicPr>
+          <p:cNvPr id="4" name="Picture 3" descr="Screen Shot 2020-04-01 at 11.49.10 AM.png"/>
+          <p:cNvPicPr>
+            <a:picLocks noChangeAspect="1"/>
+          </p:cNvPicPr>
+          <p:nvPr/>
+        </p:nvPicPr>
+        <p:blipFill>
+          <a:blip r:embed="rId2">
+            <a:extLst>
+              <a:ext uri="{28A0092B-C50C-407E-A947-70E740481C1C}">
+                <a14:useLocalDpi xmlns:a14="http://schemas.microsoft.com/office/drawing/2010/main" val="0"/>
+              </a:ext>
+            </a:extLst>
+          </a:blip>
+          <a:stretch>
+            <a:fillRect/>
+          </a:stretch>
+        </p:blipFill>
+        <p:spPr>
+          <a:xfrm>
+            <a:off x="294832" y="1485568"/>
+            <a:ext cx="7793473" cy="5185131"/>
+          </a:xfrm>
+          <a:prstGeom prst="rect">
+            <a:avLst/>
+          </a:prstGeom>
+        </p:spPr>
+      </p:pic>
+      <p:sp>
+        <p:nvSpPr>
+          <p:cNvPr id="5" name="TextBox 4"/>
           <p:cNvSpPr txBox="1"/>
           <p:nvPr/>
         </p:nvSpPr>
         <p:spPr>
           <a:xfrm>
-            <a:off x="192282" y="820452"/>
-            <a:ext cx="8241507" cy="8679298"/>
+            <a:off x="294832" y="1018258"/>
+            <a:ext cx="7597556" cy="369332"/>
           </a:xfrm>
           <a:prstGeom prst="rect">
             <a:avLst/>
@@ -3994,151 +3950,17 @@
           <a:lstStyle/>
           <a:p>
             <a:r>
-              <a:rPr lang="en-US" dirty="0"/>
-              <a:t>Since you’ve already caught your test metric going above 800 once, you don’t want to have to continually watch this dashboard to be alerted when it goes above 800 again. So let’s make life easier by creating a monitor.</a:t>
-            </a:r>
-          </a:p>
-          <a:p>
+              <a:rPr lang="en-US" dirty="0" smtClean="0"/>
+              <a:t>The image below shows the email triggered by scheduled downtime ending.</a:t>
+            </a:r>
             <a:endParaRPr lang="en-US" dirty="0"/>
-          </a:p>
-          <a:p>
-            <a:r>
-              <a:rPr lang="en-US" dirty="0"/>
-              <a:t>Create a new Metric Monitor that watches the average of your custom metric (</a:t>
-            </a:r>
-            <a:r>
-              <a:rPr lang="en-US" dirty="0" err="1"/>
-              <a:t>my_metric</a:t>
-            </a:r>
-            <a:r>
-              <a:rPr lang="en-US" dirty="0"/>
-              <a:t>) and will alert if it’s above the following values over the past 5 minutes:</a:t>
-            </a:r>
-          </a:p>
-          <a:p>
-            <a:endParaRPr lang="en-US" dirty="0"/>
-          </a:p>
-          <a:p>
-            <a:r>
-              <a:rPr lang="en-US" dirty="0"/>
-              <a:t>* Warning threshold of 500</a:t>
-            </a:r>
-          </a:p>
-          <a:p>
-            <a:r>
-              <a:rPr lang="en-US" dirty="0"/>
-              <a:t>* Alerting threshold of 800</a:t>
-            </a:r>
-          </a:p>
-          <a:p>
-            <a:pPr marL="285750" indent="-285750">
-              <a:buFontTx/>
-              <a:buChar char="•"/>
-            </a:pPr>
-            <a:r>
-              <a:rPr lang="en-US" dirty="0" smtClean="0"/>
-              <a:t>And </a:t>
-            </a:r>
-            <a:r>
-              <a:rPr lang="en-US" dirty="0"/>
-              <a:t>also ensure that it will notify you if there is No Data for this query over the past 10m</a:t>
-            </a:r>
-            <a:r>
-              <a:rPr lang="en-US" dirty="0" smtClean="0"/>
-              <a:t>.</a:t>
-            </a:r>
-          </a:p>
-          <a:p>
-            <a:pPr marL="285750" indent="-285750">
-              <a:buFontTx/>
-              <a:buChar char="•"/>
-            </a:pPr>
-            <a:endParaRPr lang="en-US" dirty="0"/>
-          </a:p>
-          <a:p>
-            <a:pPr marL="285750" indent="-285750">
-              <a:buFontTx/>
-              <a:buChar char="•"/>
-            </a:pPr>
-            <a:endParaRPr lang="en-US" dirty="0" smtClean="0"/>
-          </a:p>
-          <a:p>
-            <a:r>
-              <a:rPr lang="en-US" dirty="0"/>
-              <a:t>Please configure the monitor’s message so that it will:</a:t>
-            </a:r>
-          </a:p>
-          <a:p>
-            <a:endParaRPr lang="en-US" dirty="0"/>
-          </a:p>
-          <a:p>
-            <a:r>
-              <a:rPr lang="en-US" dirty="0"/>
-              <a:t>* Send you an email whenever the monitor triggers.</a:t>
-            </a:r>
-          </a:p>
-          <a:p>
-            <a:r>
-              <a:rPr lang="en-US" dirty="0"/>
-              <a:t>* Create different messages based on whether the monitor is in an Alert, Warning, or No Data state.</a:t>
-            </a:r>
-          </a:p>
-          <a:p>
-            <a:r>
-              <a:rPr lang="en-US" dirty="0"/>
-              <a:t>* Include the metric value that caused the monitor to trigger and host </a:t>
-            </a:r>
-            <a:r>
-              <a:rPr lang="en-US" dirty="0" err="1"/>
-              <a:t>ip</a:t>
-            </a:r>
-            <a:r>
-              <a:rPr lang="en-US" dirty="0"/>
-              <a:t> when the Monitor triggers an Alert state.</a:t>
-            </a:r>
-          </a:p>
-          <a:p>
-            <a:r>
-              <a:rPr lang="en-US" dirty="0"/>
-              <a:t>* When this monitor sends you an email notification, take a screenshot of the email that it sends you.</a:t>
-            </a:r>
-          </a:p>
-          <a:p>
-            <a:endParaRPr lang="en-US" dirty="0"/>
-          </a:p>
-          <a:p>
-            <a:r>
-              <a:rPr lang="en-US" dirty="0"/>
-              <a:t>* **Bonus Question**: Since this monitor is going to alert pretty often, you don’t want to be alerted when you are out of the office. Set up two scheduled downtimes for this monitor:</a:t>
-            </a:r>
-          </a:p>
-          <a:p>
-            <a:endParaRPr lang="en-US" dirty="0"/>
-          </a:p>
-          <a:p>
-            <a:r>
-              <a:rPr lang="en-US" dirty="0"/>
-              <a:t>  * One that silences it from 7pm to 9am daily on M-F,</a:t>
-            </a:r>
-          </a:p>
-          <a:p>
-            <a:r>
-              <a:rPr lang="en-US" dirty="0"/>
-              <a:t>  * And one that silences it all day on Sat-Sun.</a:t>
-            </a:r>
-          </a:p>
-          <a:p>
-            <a:r>
-              <a:rPr lang="en-US" dirty="0"/>
-              <a:t>  * Make sure that your email is notified when you schedule the downtime and take a screenshot of that notification.</a:t>
-            </a:r>
           </a:p>
         </p:txBody>
       </p:sp>
     </p:spTree>
     <p:extLst>
       <p:ext uri="{BB962C8B-B14F-4D97-AF65-F5344CB8AC3E}">
-        <p14:creationId xmlns:p14="http://schemas.microsoft.com/office/powerpoint/2010/main" val="660703615"/>
+        <p14:creationId xmlns:p14="http://schemas.microsoft.com/office/powerpoint/2010/main" val="1351087018"/>
       </p:ext>
     </p:extLst>
   </p:cSld>
@@ -4201,16 +4023,46 @@
           </a:p>
         </p:txBody>
       </p:sp>
-      <p:sp>
-        <p:nvSpPr>
-          <p:cNvPr id="3" name="TextBox 2"/>
+      <p:pic>
+        <p:nvPicPr>
+          <p:cNvPr id="4" name="Picture 3" descr="Screen Shot 2020-04-01 at 9.21.16 AM.png"/>
+          <p:cNvPicPr>
+            <a:picLocks noChangeAspect="1"/>
+          </p:cNvPicPr>
+          <p:nvPr/>
+        </p:nvPicPr>
+        <p:blipFill>
+          <a:blip r:embed="rId2">
+            <a:extLst>
+              <a:ext uri="{28A0092B-C50C-407E-A947-70E740481C1C}">
+                <a14:useLocalDpi xmlns:a14="http://schemas.microsoft.com/office/drawing/2010/main" val="0"/>
+              </a:ext>
+            </a:extLst>
+          </a:blip>
+          <a:stretch>
+            <a:fillRect/>
+          </a:stretch>
+        </p:blipFill>
+        <p:spPr>
+          <a:xfrm>
+            <a:off x="1236020" y="1940473"/>
+            <a:ext cx="6112064" cy="4752725"/>
+          </a:xfrm>
+          <a:prstGeom prst="rect">
+            <a:avLst/>
+          </a:prstGeom>
+        </p:spPr>
+      </p:pic>
+      <p:sp>
+        <p:nvSpPr>
+          <p:cNvPr id="5" name="TextBox 4"/>
           <p:cNvSpPr txBox="1"/>
           <p:nvPr/>
         </p:nvSpPr>
         <p:spPr>
           <a:xfrm>
-            <a:off x="192282" y="820452"/>
-            <a:ext cx="8241507" cy="3970318"/>
+            <a:off x="170095" y="926423"/>
+            <a:ext cx="7983104" cy="923330"/>
           </a:xfrm>
           <a:prstGeom prst="rect">
             <a:avLst/>
@@ -4224,74 +4076,8 @@
           <a:lstStyle/>
           <a:p>
             <a:r>
-              <a:rPr lang="en-US" dirty="0"/>
-              <a:t>Given the following Flask app (or any Python/Ruby/Go app of your choice) instrument this using </a:t>
-            </a:r>
-            <a:r>
-              <a:rPr lang="en-US" dirty="0" err="1"/>
-              <a:t>Datadog’s</a:t>
-            </a:r>
-            <a:r>
-              <a:rPr lang="en-US" dirty="0"/>
-              <a:t> APM solution</a:t>
-            </a:r>
-            <a:r>
               <a:rPr lang="en-US" dirty="0" smtClean="0"/>
-              <a:t>:</a:t>
-            </a:r>
-          </a:p>
-          <a:p>
-            <a:endParaRPr lang="en-US" dirty="0"/>
-          </a:p>
-          <a:p>
-            <a:endParaRPr lang="en-US" dirty="0" smtClean="0"/>
-          </a:p>
-          <a:p>
-            <a:endParaRPr lang="en-US" dirty="0"/>
-          </a:p>
-          <a:p>
-            <a:r>
-              <a:rPr lang="en-US" dirty="0"/>
-              <a:t>* **Note**: Using both </a:t>
-            </a:r>
-            <a:r>
-              <a:rPr lang="en-US" dirty="0" err="1"/>
-              <a:t>ddtrace</a:t>
-            </a:r>
-            <a:r>
-              <a:rPr lang="en-US" dirty="0"/>
-              <a:t>-run and manually inserting the Middleware has been known to cause issues. Please only use one or the other.</a:t>
-            </a:r>
-          </a:p>
-          <a:p>
-            <a:endParaRPr lang="en-US" dirty="0"/>
-          </a:p>
-          <a:p>
-            <a:r>
-              <a:rPr lang="en-US" dirty="0"/>
-              <a:t>* **Bonus Question**: What is the difference between a Service and a Resource?</a:t>
-            </a:r>
-          </a:p>
-          <a:p>
-            <a:endParaRPr lang="en-US" dirty="0"/>
-          </a:p>
-          <a:p>
-            <a:r>
-              <a:rPr lang="en-US" dirty="0"/>
-              <a:t>Provide a link and a screenshot of a Dashboard with both APM and Infrastructure Metrics.</a:t>
-            </a:r>
-          </a:p>
-          <a:p>
-            <a:endParaRPr lang="en-US" dirty="0"/>
-          </a:p>
-          <a:p>
-            <a:r>
-              <a:rPr lang="en-US" dirty="0"/>
-              <a:t>Please include your fully instrumented app in your submission, as well</a:t>
-            </a:r>
-            <a:r>
-              <a:rPr lang="en-US" dirty="0" smtClean="0"/>
-              <a:t>.</a:t>
+              <a:t>This script instruments the APM functionality within a Flask API. I installed an Nginx server that pointed to the Flask API so I could generate dummy data both locally and automatically from another cloud server. </a:t>
             </a:r>
             <a:endParaRPr lang="en-US" dirty="0"/>
           </a:p>
@@ -4300,7 +4086,7 @@
     </p:spTree>
     <p:extLst>
       <p:ext uri="{BB962C8B-B14F-4D97-AF65-F5344CB8AC3E}">
-        <p14:creationId xmlns:p14="http://schemas.microsoft.com/office/powerpoint/2010/main" val="236926291"/>
+        <p14:creationId xmlns:p14="http://schemas.microsoft.com/office/powerpoint/2010/main" val="4238635660"/>
       </p:ext>
     </p:extLst>
   </p:cSld>
@@ -4339,7 +4125,7 @@
         </p:nvSpPr>
         <p:spPr>
           <a:xfrm>
-            <a:off x="546832" y="-124742"/>
+            <a:off x="546832" y="-226802"/>
             <a:ext cx="8014594" cy="1143000"/>
           </a:xfrm>
         </p:spPr>
@@ -4363,48 +4149,9 @@
           </a:p>
         </p:txBody>
       </p:sp>
-      <p:sp>
-        <p:nvSpPr>
-          <p:cNvPr id="3" name="TextBox 2"/>
-          <p:cNvSpPr txBox="1"/>
-          <p:nvPr/>
-        </p:nvSpPr>
-        <p:spPr>
-          <a:xfrm>
-            <a:off x="112412" y="5593198"/>
-            <a:ext cx="8241507" cy="923330"/>
-          </a:xfrm>
-          <a:prstGeom prst="rect">
-            <a:avLst/>
-          </a:prstGeom>
-          <a:noFill/>
-        </p:spPr>
-        <p:txBody>
-          <a:bodyPr wrap="square" rtlCol="0">
-            <a:spAutoFit/>
-          </a:bodyPr>
-          <a:lstStyle/>
-          <a:p>
-            <a:endParaRPr lang="en-US" dirty="0"/>
-          </a:p>
-          <a:p>
-            <a:r>
-              <a:rPr lang="en-US" dirty="0" smtClean="0"/>
-              <a:t>What </a:t>
-            </a:r>
-            <a:r>
-              <a:rPr lang="en-US" dirty="0"/>
-              <a:t>is the difference between a Service and a Resource?</a:t>
-            </a:r>
-          </a:p>
-          <a:p>
-            <a:endParaRPr lang="en-US" dirty="0"/>
-          </a:p>
-        </p:txBody>
-      </p:sp>
       <p:pic>
         <p:nvPicPr>
-          <p:cNvPr id="4" name="Picture 3" descr="Screen Shot 2020-04-01 at 9.21.16 AM.png"/>
+          <p:cNvPr id="6" name="Picture 5" descr="Screen Shot 2020-04-01 at 9.29.52 AM.png"/>
           <p:cNvPicPr>
             <a:picLocks noChangeAspect="1"/>
           </p:cNvPicPr>
@@ -4424,18 +4171,87 @@
         </p:blipFill>
         <p:spPr>
           <a:xfrm>
-            <a:off x="1236020" y="851813"/>
-            <a:ext cx="6112064" cy="4752725"/>
+            <a:off x="626210" y="1595425"/>
+            <a:ext cx="7472821" cy="3485556"/>
           </a:xfrm>
           <a:prstGeom prst="rect">
             <a:avLst/>
           </a:prstGeom>
         </p:spPr>
       </p:pic>
+      <p:sp>
+        <p:nvSpPr>
+          <p:cNvPr id="3" name="TextBox 2"/>
+          <p:cNvSpPr txBox="1"/>
+          <p:nvPr/>
+        </p:nvSpPr>
+        <p:spPr>
+          <a:xfrm>
+            <a:off x="272152" y="5103105"/>
+            <a:ext cx="7838219" cy="1754327"/>
+          </a:xfrm>
+          <a:prstGeom prst="rect">
+            <a:avLst/>
+          </a:prstGeom>
+          <a:noFill/>
+        </p:spPr>
+        <p:txBody>
+          <a:bodyPr wrap="square" rtlCol="0">
+            <a:spAutoFit/>
+          </a:bodyPr>
+          <a:lstStyle/>
+          <a:p>
+            <a:r>
+              <a:rPr lang="en-US" dirty="0" smtClean="0"/>
+              <a:t>A resource supports a specific piece of data such as a user of an application. REST semantics structure a set of operations that can take place on the piece of data such as updating, creating, deleting and retrieving.</a:t>
+            </a:r>
+          </a:p>
+          <a:p>
+            <a:endParaRPr lang="en-US" dirty="0"/>
+          </a:p>
+          <a:p>
+            <a:r>
+              <a:rPr lang="en-US" dirty="0" smtClean="0"/>
+              <a:t>A service is a software implementation that supports a business relevant functionality, such as an authentication service. </a:t>
+            </a:r>
+            <a:endParaRPr lang="en-US" dirty="0"/>
+          </a:p>
+        </p:txBody>
+      </p:sp>
+      <p:sp>
+        <p:nvSpPr>
+          <p:cNvPr id="4" name="TextBox 3"/>
+          <p:cNvSpPr txBox="1"/>
+          <p:nvPr/>
+        </p:nvSpPr>
+        <p:spPr>
+          <a:xfrm>
+            <a:off x="147415" y="691757"/>
+            <a:ext cx="8096501" cy="923330"/>
+          </a:xfrm>
+          <a:prstGeom prst="rect">
+            <a:avLst/>
+          </a:prstGeom>
+          <a:noFill/>
+        </p:spPr>
+        <p:txBody>
+          <a:bodyPr wrap="square" rtlCol="0">
+            <a:spAutoFit/>
+          </a:bodyPr>
+          <a:lstStyle/>
+          <a:p>
+            <a:r>
+              <a:rPr lang="en-US" dirty="0" smtClean="0"/>
+              <a:t>These graphs show data generated from the Flask app in terms of requests and request duration, as well as CPU and system load information from the server running the application.</a:t>
+            </a:r>
+            <a:endParaRPr lang="en-US" dirty="0"/>
+          </a:p>
+        </p:txBody>
+      </p:sp>
     </p:spTree>
     <p:extLst>
       <p:ext uri="{BB962C8B-B14F-4D97-AF65-F5344CB8AC3E}">
-        <p14:creationId xmlns:p14="http://schemas.microsoft.com/office/powerpoint/2010/main" val="4238635660"/>
+        <p14:creationId xmlns:p14="http://schemas.microsoft.com/office/powerpoint/2010/main" val="2193043525"/>
       </p:ext>
     </p:extLst>
   </p:cSld>
@@ -4474,8 +4290,8 @@
         </p:nvSpPr>
         <p:spPr>
           <a:xfrm>
-            <a:off x="546832" y="-124742"/>
-            <a:ext cx="8014594" cy="1143000"/>
+            <a:off x="-497" y="-124742"/>
+            <a:ext cx="8595936" cy="1143000"/>
           </a:xfrm>
         </p:spPr>
         <p:txBody>
@@ -4488,7 +4304,7 @@
                   <a:schemeClr val="tx1"/>
                 </a:solidFill>
               </a:rPr>
-              <a:t>Collecting APM Data</a:t>
+              <a:t>What Would You Use Datadog For?</a:t>
             </a:r>
             <a:endParaRPr lang="en-US" dirty="0">
               <a:solidFill>
@@ -4500,38 +4316,77 @@
       </p:sp>
       <p:pic>
         <p:nvPicPr>
-          <p:cNvPr id="6" name="Picture 5" descr="Screen Shot 2020-04-01 at 9.29.52 AM.png"/>
+          <p:cNvPr id="4" name="Picture 3"/>
           <p:cNvPicPr>
             <a:picLocks noChangeAspect="1"/>
           </p:cNvPicPr>
           <p:nvPr/>
         </p:nvPicPr>
         <p:blipFill>
-          <a:blip r:embed="rId2">
-            <a:extLst>
-              <a:ext uri="{28A0092B-C50C-407E-A947-70E740481C1C}">
-                <a14:useLocalDpi xmlns:a14="http://schemas.microsoft.com/office/drawing/2010/main" val="0"/>
-              </a:ext>
-            </a:extLst>
-          </a:blip>
+          <a:blip r:embed="rId2"/>
           <a:stretch>
             <a:fillRect/>
           </a:stretch>
         </p:blipFill>
         <p:spPr>
           <a:xfrm>
-            <a:off x="626210" y="1595425"/>
-            <a:ext cx="7472821" cy="3485556"/>
+            <a:off x="349226" y="1253871"/>
+            <a:ext cx="4742272" cy="4742272"/>
           </a:xfrm>
           <a:prstGeom prst="rect">
             <a:avLst/>
           </a:prstGeom>
         </p:spPr>
       </p:pic>
+      <p:sp>
+        <p:nvSpPr>
+          <p:cNvPr id="5" name="TextBox 4"/>
+          <p:cNvSpPr txBox="1"/>
+          <p:nvPr/>
+        </p:nvSpPr>
+        <p:spPr>
+          <a:xfrm>
+            <a:off x="5647139" y="1871137"/>
+            <a:ext cx="2574098" cy="3139321"/>
+          </a:xfrm>
+          <a:prstGeom prst="rect">
+            <a:avLst/>
+          </a:prstGeom>
+          <a:noFill/>
+        </p:spPr>
+        <p:txBody>
+          <a:bodyPr wrap="square" rtlCol="0">
+            <a:spAutoFit/>
+          </a:bodyPr>
+          <a:lstStyle/>
+          <a:p>
+            <a:r>
+              <a:rPr lang="en-US" dirty="0" smtClean="0"/>
+              <a:t>I would place an AWS IoT button next to the sink and track the frequency with which I am washing my hands. </a:t>
+            </a:r>
+          </a:p>
+          <a:p>
+            <a:endParaRPr lang="en-US" dirty="0"/>
+          </a:p>
+          <a:p>
+            <a:r>
+              <a:rPr lang="en-US" dirty="0" smtClean="0"/>
+              <a:t>I would set an alert if the button was not triggered within a 3 hour time frame during the hours of 7am to 10pm.   </a:t>
+            </a:r>
+            <a:r>
+              <a:rPr lang="en-US" dirty="0" smtClean="0">
+                <a:sym typeface="Wingdings"/>
+              </a:rPr>
+              <a:t></a:t>
+            </a:r>
+            <a:endParaRPr lang="en-US" dirty="0"/>
+          </a:p>
+        </p:txBody>
+      </p:sp>
     </p:spTree>
     <p:extLst>
       <p:ext uri="{BB962C8B-B14F-4D97-AF65-F5344CB8AC3E}">
-        <p14:creationId xmlns:p14="http://schemas.microsoft.com/office/powerpoint/2010/main" val="2193043525"/>
+        <p14:creationId xmlns:p14="http://schemas.microsoft.com/office/powerpoint/2010/main" val="2952515118"/>
       </p:ext>
     </p:extLst>
   </p:cSld>
@@ -4570,8 +4425,8 @@
         </p:nvSpPr>
         <p:spPr>
           <a:xfrm>
-            <a:off x="-497" y="-124742"/>
-            <a:ext cx="8595936" cy="1143000"/>
+            <a:off x="396887" y="-294842"/>
+            <a:ext cx="8198552" cy="1143000"/>
           </a:xfrm>
         </p:spPr>
         <p:txBody>
@@ -4579,30 +4434,14 @@
           <a:lstStyle/>
           <a:p>
             <a:r>
-              <a:rPr lang="en-US" dirty="0" smtClean="0">
+              <a:rPr lang="en-US" sz="4000" dirty="0" smtClean="0">
                 <a:solidFill>
                   <a:schemeClr val="tx1"/>
                 </a:solidFill>
               </a:rPr>
-              <a:t>What Would You Use </a:t>
-            </a:r>
-            <a:r>
-              <a:rPr lang="en-US" dirty="0" err="1" smtClean="0">
-                <a:solidFill>
-                  <a:schemeClr val="tx1"/>
-                </a:solidFill>
-              </a:rPr>
-              <a:t>Datadog</a:t>
-            </a:r>
-            <a:r>
-              <a:rPr lang="en-US" dirty="0" smtClean="0">
-                <a:solidFill>
-                  <a:schemeClr val="tx1"/>
-                </a:solidFill>
-              </a:rPr>
-              <a:t> For?</a:t>
-            </a:r>
-            <a:endParaRPr lang="en-US" dirty="0">
+              <a:t>Automatic Data Generation</a:t>
+            </a:r>
+            <a:endParaRPr lang="en-US" sz="4000" dirty="0">
               <a:solidFill>
                 <a:schemeClr val="tx1"/>
               </a:solidFill>
@@ -4610,16 +4449,46 @@
           </a:p>
         </p:txBody>
       </p:sp>
-      <p:sp>
-        <p:nvSpPr>
-          <p:cNvPr id="3" name="TextBox 2"/>
+      <p:pic>
+        <p:nvPicPr>
+          <p:cNvPr id="4" name="Picture 3" descr="Screen Shot 2020-04-01 at 11.07.30 AM.png"/>
+          <p:cNvPicPr>
+            <a:picLocks noChangeAspect="1"/>
+          </p:cNvPicPr>
+          <p:nvPr/>
+        </p:nvPicPr>
+        <p:blipFill>
+          <a:blip r:embed="rId2">
+            <a:extLst>
+              <a:ext uri="{28A0092B-C50C-407E-A947-70E740481C1C}">
+                <a14:useLocalDpi xmlns:a14="http://schemas.microsoft.com/office/drawing/2010/main" val="0"/>
+              </a:ext>
+            </a:extLst>
+          </a:blip>
+          <a:stretch>
+            <a:fillRect/>
+          </a:stretch>
+        </p:blipFill>
+        <p:spPr>
+          <a:xfrm>
+            <a:off x="1177066" y="1366231"/>
+            <a:ext cx="6420491" cy="5454713"/>
+          </a:xfrm>
+          <a:prstGeom prst="rect">
+            <a:avLst/>
+          </a:prstGeom>
+        </p:spPr>
+      </p:pic>
+      <p:sp>
+        <p:nvSpPr>
+          <p:cNvPr id="5" name="TextBox 4"/>
           <p:cNvSpPr txBox="1"/>
           <p:nvPr/>
         </p:nvSpPr>
         <p:spPr>
           <a:xfrm>
-            <a:off x="203130" y="1648288"/>
-            <a:ext cx="8241507" cy="1477328"/>
+            <a:off x="249472" y="555674"/>
+            <a:ext cx="8187218" cy="646331"/>
           </a:xfrm>
           <a:prstGeom prst="rect">
             <a:avLst/>
@@ -4633,53 +4502,48 @@
           <a:lstStyle/>
           <a:p>
             <a:r>
-              <a:rPr lang="en-US" dirty="0" err="1"/>
-              <a:t>Datadog</a:t>
-            </a:r>
-            <a:r>
-              <a:rPr lang="en-US" dirty="0"/>
-              <a:t> has been used in a lot of creative ways in the past. We’ve written some blog posts about using </a:t>
-            </a:r>
-            <a:r>
-              <a:rPr lang="en-US" dirty="0" err="1"/>
-              <a:t>Datadog</a:t>
-            </a:r>
-            <a:r>
-              <a:rPr lang="en-US" dirty="0"/>
-              <a:t> to monitor the NYC Subway System, </a:t>
-            </a:r>
-            <a:r>
-              <a:rPr lang="en-US" dirty="0" err="1"/>
-              <a:t>Pokemon</a:t>
-            </a:r>
-            <a:r>
-              <a:rPr lang="en-US" dirty="0"/>
-              <a:t> Go, and even office restroom availability!</a:t>
-            </a:r>
-          </a:p>
-          <a:p>
+              <a:rPr lang="en-US" dirty="0" smtClean="0"/>
+              <a:t>This script executes a recursive function that either queries or inserts data into the database.</a:t>
+            </a:r>
             <a:endParaRPr lang="en-US" dirty="0"/>
           </a:p>
-          <a:p>
-            <a:r>
-              <a:rPr lang="en-US" dirty="0"/>
-              <a:t>Is there anything creative you would use </a:t>
-            </a:r>
-            <a:r>
-              <a:rPr lang="en-US" dirty="0" err="1"/>
-              <a:t>Datadog</a:t>
-            </a:r>
-            <a:r>
-              <a:rPr lang="en-US" dirty="0"/>
-              <a:t> for?</a:t>
-            </a:r>
+        </p:txBody>
+      </p:sp>
+      <p:sp>
+        <p:nvSpPr>
+          <p:cNvPr id="6" name="TextBox 5"/>
+          <p:cNvSpPr txBox="1"/>
+          <p:nvPr/>
+        </p:nvSpPr>
+        <p:spPr>
+          <a:xfrm>
+            <a:off x="2256588" y="950218"/>
+            <a:ext cx="4025571" cy="369332"/>
+          </a:xfrm>
+          <a:prstGeom prst="rect">
+            <a:avLst/>
+          </a:prstGeom>
+          <a:noFill/>
+        </p:spPr>
+        <p:txBody>
+          <a:bodyPr wrap="square" rtlCol="0">
+            <a:spAutoFit/>
+          </a:bodyPr>
+          <a:lstStyle/>
+          <a:p>
+            <a:pPr algn="ctr"/>
+            <a:r>
+              <a:rPr lang="en-US" dirty="0" smtClean="0"/>
+              <a:t>database_activity.js</a:t>
+            </a:r>
+            <a:endParaRPr lang="en-US" dirty="0"/>
           </a:p>
         </p:txBody>
       </p:sp>
     </p:spTree>
     <p:extLst>
       <p:ext uri="{BB962C8B-B14F-4D97-AF65-F5344CB8AC3E}">
-        <p14:creationId xmlns:p14="http://schemas.microsoft.com/office/powerpoint/2010/main" val="2952515118"/>
+        <p14:creationId xmlns:p14="http://schemas.microsoft.com/office/powerpoint/2010/main" val="5650494"/>
       </p:ext>
     </p:extLst>
   </p:cSld>
@@ -4718,8 +4582,8 @@
         </p:nvSpPr>
         <p:spPr>
           <a:xfrm>
-            <a:off x="546832" y="153742"/>
-            <a:ext cx="6226829" cy="1143000"/>
+            <a:off x="396887" y="-294842"/>
+            <a:ext cx="8198552" cy="1143000"/>
           </a:xfrm>
         </p:spPr>
         <p:txBody>
@@ -4727,14 +4591,14 @@
           <a:lstStyle/>
           <a:p>
             <a:r>
-              <a:rPr lang="en-US" dirty="0" smtClean="0">
+              <a:rPr lang="en-US" sz="4000" dirty="0" smtClean="0">
                 <a:solidFill>
                   <a:schemeClr val="tx1"/>
                 </a:solidFill>
               </a:rPr>
-              <a:t>References</a:t>
-            </a:r>
-            <a:endParaRPr lang="en-US" dirty="0">
+              <a:t>Automatic Data Generation</a:t>
+            </a:r>
+            <a:endParaRPr lang="en-US" sz="4000" dirty="0">
               <a:solidFill>
                 <a:schemeClr val="tx1"/>
               </a:solidFill>
@@ -4742,16 +4606,46 @@
           </a:p>
         </p:txBody>
       </p:sp>
-      <p:sp>
-        <p:nvSpPr>
-          <p:cNvPr id="3" name="TextBox 2"/>
+      <p:pic>
+        <p:nvPicPr>
+          <p:cNvPr id="3" name="Picture 2" descr="Screen Shot 2020-04-01 at 11.07.50 AM.png"/>
+          <p:cNvPicPr>
+            <a:picLocks noChangeAspect="1"/>
+          </p:cNvPicPr>
+          <p:nvPr/>
+        </p:nvPicPr>
+        <p:blipFill>
+          <a:blip r:embed="rId2">
+            <a:extLst>
+              <a:ext uri="{28A0092B-C50C-407E-A947-70E740481C1C}">
+                <a14:useLocalDpi xmlns:a14="http://schemas.microsoft.com/office/drawing/2010/main" val="0"/>
+              </a:ext>
+            </a:extLst>
+          </a:blip>
+          <a:stretch>
+            <a:fillRect/>
+          </a:stretch>
+        </p:blipFill>
+        <p:spPr>
+          <a:xfrm>
+            <a:off x="1833501" y="1735054"/>
+            <a:ext cx="4390521" cy="5100266"/>
+          </a:xfrm>
+          <a:prstGeom prst="rect">
+            <a:avLst/>
+          </a:prstGeom>
+        </p:spPr>
+      </p:pic>
+      <p:sp>
+        <p:nvSpPr>
+          <p:cNvPr id="5" name="TextBox 4"/>
           <p:cNvSpPr txBox="1"/>
           <p:nvPr/>
         </p:nvSpPr>
         <p:spPr>
           <a:xfrm>
-            <a:off x="220877" y="1296742"/>
-            <a:ext cx="8241507" cy="646331"/>
+            <a:off x="249472" y="589694"/>
+            <a:ext cx="8187218" cy="646331"/>
           </a:xfrm>
           <a:prstGeom prst="rect">
             <a:avLst/>
@@ -4764,16 +4658,40 @@
           </a:bodyPr>
           <a:lstStyle/>
           <a:p>
-            <a:endParaRPr lang="en-US" dirty="0" smtClean="0"/>
-          </a:p>
-          <a:p>
-            <a:pPr marL="342900" indent="-342900">
-              <a:buFont typeface="+mj-lt"/>
-              <a:buAutoNum type="arabicPeriod"/>
-            </a:pPr>
-            <a:r>
-              <a:rPr lang="en-US" dirty="0" err="1" smtClean="0"/>
-              <a:t>asdf</a:t>
+            <a:r>
+              <a:rPr lang="en-US" dirty="0" smtClean="0"/>
+              <a:t>This script executes a recursive function that hits one of the endpoints on the application monitored with APM.  </a:t>
+            </a:r>
+            <a:endParaRPr lang="en-US" dirty="0"/>
+          </a:p>
+        </p:txBody>
+      </p:sp>
+      <p:sp>
+        <p:nvSpPr>
+          <p:cNvPr id="6" name="TextBox 5"/>
+          <p:cNvSpPr txBox="1"/>
+          <p:nvPr/>
+        </p:nvSpPr>
+        <p:spPr>
+          <a:xfrm>
+            <a:off x="2029795" y="1319550"/>
+            <a:ext cx="4025571" cy="369332"/>
+          </a:xfrm>
+          <a:prstGeom prst="rect">
+            <a:avLst/>
+          </a:prstGeom>
+          <a:noFill/>
+        </p:spPr>
+        <p:txBody>
+          <a:bodyPr wrap="square" rtlCol="0">
+            <a:spAutoFit/>
+          </a:bodyPr>
+          <a:lstStyle/>
+          <a:p>
+            <a:pPr algn="ctr"/>
+            <a:r>
+              <a:rPr lang="en-US" dirty="0" smtClean="0"/>
+              <a:t>webserver_activity.js</a:t>
             </a:r>
             <a:endParaRPr lang="en-US" dirty="0"/>
           </a:p>
@@ -4782,7 +4700,7 @@
     </p:spTree>
     <p:extLst>
       <p:ext uri="{BB962C8B-B14F-4D97-AF65-F5344CB8AC3E}">
-        <p14:creationId xmlns:p14="http://schemas.microsoft.com/office/powerpoint/2010/main" val="530626221"/>
+        <p14:creationId xmlns:p14="http://schemas.microsoft.com/office/powerpoint/2010/main" val="2237889284"/>
       </p:ext>
     </p:extLst>
   </p:cSld>
@@ -4969,7 +4887,7 @@
         <p:spPr>
           <a:xfrm>
             <a:off x="1181300" y="1598972"/>
-            <a:ext cx="6019370" cy="2246769"/>
+            <a:ext cx="6019370" cy="2677656"/>
           </a:xfrm>
           <a:prstGeom prst="rect">
             <a:avLst/>
@@ -4988,7 +4906,11 @@
             </a:pPr>
             <a:r>
               <a:rPr lang="en-US" sz="2800" b="1" dirty="0" smtClean="0"/>
-              <a:t>Collecting Metrics</a:t>
+              <a:t> Collecting </a:t>
+            </a:r>
+            <a:r>
+              <a:rPr lang="en-US" sz="2800" b="1" dirty="0" smtClean="0"/>
+              <a:t>Metrics</a:t>
             </a:r>
           </a:p>
           <a:p>
@@ -5028,15 +4950,25 @@
             </a:pPr>
             <a:r>
               <a:rPr lang="en-US" sz="2800" b="1" dirty="0" smtClean="0"/>
-              <a:t> What Would You Use </a:t>
-            </a:r>
-            <a:r>
-              <a:rPr lang="en-US" sz="2800" b="1" dirty="0" err="1" smtClean="0"/>
-              <a:t>Datadog</a:t>
+              <a:t> What Would You Use Datadog for</a:t>
             </a:r>
             <a:r>
               <a:rPr lang="en-US" sz="2800" b="1" dirty="0" smtClean="0"/>
-              <a:t> for?</a:t>
+              <a:t>?</a:t>
+            </a:r>
+          </a:p>
+          <a:p>
+            <a:pPr marL="342900" indent="-342900">
+              <a:buFont typeface="+mj-lt"/>
+              <a:buAutoNum type="arabicPeriod"/>
+            </a:pPr>
+            <a:r>
+              <a:rPr lang="en-US" sz="2800" b="1" dirty="0"/>
+              <a:t> </a:t>
+            </a:r>
+            <a:r>
+              <a:rPr lang="en-US" sz="2800" b="1" dirty="0" smtClean="0"/>
+              <a:t>Automatic Data Generation</a:t>
             </a:r>
             <a:endParaRPr lang="en-US" sz="2800" b="1" dirty="0"/>
           </a:p>
@@ -5145,6 +5077,44 @@
           </a:prstGeom>
         </p:spPr>
       </p:pic>
+      <p:sp>
+        <p:nvSpPr>
+          <p:cNvPr id="3" name="TextBox 2"/>
+          <p:cNvSpPr txBox="1"/>
+          <p:nvPr/>
+        </p:nvSpPr>
+        <p:spPr>
+          <a:xfrm>
+            <a:off x="102056" y="873198"/>
+            <a:ext cx="8232577" cy="923330"/>
+          </a:xfrm>
+          <a:prstGeom prst="rect">
+            <a:avLst/>
+          </a:prstGeom>
+          <a:noFill/>
+        </p:spPr>
+        <p:txBody>
+          <a:bodyPr wrap="square" rtlCol="0">
+            <a:spAutoFit/>
+          </a:bodyPr>
+          <a:lstStyle/>
+          <a:p>
+            <a:r>
+              <a:rPr lang="en-US" dirty="0" smtClean="0"/>
+              <a:t>This image shows the three hosts that I installed the Datadog agent on. I installed the agent on a </a:t>
+            </a:r>
+            <a:r>
+              <a:rPr lang="en-US" dirty="0"/>
+              <a:t>D</a:t>
+            </a:r>
+            <a:r>
+              <a:rPr lang="en-US" dirty="0" smtClean="0"/>
+              <a:t>ocker container, and two Ubuntu AWS images. I then added relevant tags to differentiate and sort the hosts. </a:t>
+            </a:r>
+            <a:endParaRPr lang="en-US" dirty="0"/>
+          </a:p>
+        </p:txBody>
+      </p:sp>
     </p:spTree>
     <p:extLst>
       <p:ext uri="{BB962C8B-B14F-4D97-AF65-F5344CB8AC3E}">
@@ -5187,7 +5157,7 @@
         </p:nvSpPr>
         <p:spPr>
           <a:xfrm>
-            <a:off x="546832" y="-124742"/>
+            <a:off x="546832" y="-204122"/>
             <a:ext cx="8014594" cy="1143000"/>
           </a:xfrm>
         </p:spPr>
@@ -5233,7 +5203,7 @@
         </p:blipFill>
         <p:spPr>
           <a:xfrm>
-            <a:off x="204112" y="1179383"/>
+            <a:off x="204112" y="1576291"/>
             <a:ext cx="8189473" cy="4978358"/>
           </a:xfrm>
           <a:prstGeom prst="rect">
@@ -5241,6 +5211,36 @@
           </a:prstGeom>
         </p:spPr>
       </p:pic>
+      <p:sp>
+        <p:nvSpPr>
+          <p:cNvPr id="4" name="TextBox 3"/>
+          <p:cNvSpPr txBox="1"/>
+          <p:nvPr/>
+        </p:nvSpPr>
+        <p:spPr>
+          <a:xfrm>
+            <a:off x="181432" y="793817"/>
+            <a:ext cx="8189473" cy="646331"/>
+          </a:xfrm>
+          <a:prstGeom prst="rect">
+            <a:avLst/>
+          </a:prstGeom>
+          <a:noFill/>
+        </p:spPr>
+        <p:txBody>
+          <a:bodyPr wrap="square" rtlCol="0">
+            <a:spAutoFit/>
+          </a:bodyPr>
+          <a:lstStyle/>
+          <a:p>
+            <a:r>
+              <a:rPr lang="en-US" dirty="0" smtClean="0"/>
+              <a:t>This dashboard shows the information produced through the installation of Datadog monitoring on my Postgresql database.</a:t>
+            </a:r>
+            <a:endParaRPr lang="en-US" dirty="0"/>
+          </a:p>
+        </p:txBody>
+      </p:sp>
     </p:spTree>
     <p:extLst>
       <p:ext uri="{BB962C8B-B14F-4D97-AF65-F5344CB8AC3E}">
@@ -5309,7 +5309,7 @@
       </p:sp>
       <p:pic>
         <p:nvPicPr>
-          <p:cNvPr id="3" name="Picture 2" descr="Screen Shot 2020-04-01 at 9.07.17 AM.png"/>
+          <p:cNvPr id="4" name="Picture 3" descr="Screen Shot 2020-04-01 at 9.09.35 AM.png"/>
           <p:cNvPicPr>
             <a:picLocks noChangeAspect="1"/>
           </p:cNvPicPr>
@@ -5329,18 +5329,152 @@
         </p:blipFill>
         <p:spPr>
           <a:xfrm>
-            <a:off x="226793" y="1258765"/>
-            <a:ext cx="7861897" cy="4254674"/>
+            <a:off x="115758" y="3583219"/>
+            <a:ext cx="6096000" cy="3149600"/>
           </a:xfrm>
           <a:prstGeom prst="rect">
             <a:avLst/>
           </a:prstGeom>
         </p:spPr>
       </p:pic>
+      <p:pic>
+        <p:nvPicPr>
+          <p:cNvPr id="5" name="Picture 4" descr="Screen Shot 2020-04-01 at 9.09.44 AM.png"/>
+          <p:cNvPicPr>
+            <a:picLocks noChangeAspect="1"/>
+          </p:cNvPicPr>
+          <p:nvPr/>
+        </p:nvPicPr>
+        <p:blipFill>
+          <a:blip r:embed="rId3">
+            <a:extLst>
+              <a:ext uri="{28A0092B-C50C-407E-A947-70E740481C1C}">
+                <a14:useLocalDpi xmlns:a14="http://schemas.microsoft.com/office/drawing/2010/main" val="0"/>
+              </a:ext>
+            </a:extLst>
+          </a:blip>
+          <a:stretch>
+            <a:fillRect/>
+          </a:stretch>
+        </p:blipFill>
+        <p:spPr>
+          <a:xfrm>
+            <a:off x="4179758" y="1579564"/>
+            <a:ext cx="4064000" cy="2374900"/>
+          </a:xfrm>
+          <a:prstGeom prst="rect">
+            <a:avLst/>
+          </a:prstGeom>
+        </p:spPr>
+      </p:pic>
+      <p:sp>
+        <p:nvSpPr>
+          <p:cNvPr id="6" name="TextBox 5"/>
+          <p:cNvSpPr txBox="1"/>
+          <p:nvPr/>
+        </p:nvSpPr>
+        <p:spPr>
+          <a:xfrm>
+            <a:off x="226793" y="1018258"/>
+            <a:ext cx="3537967" cy="2031325"/>
+          </a:xfrm>
+          <a:prstGeom prst="rect">
+            <a:avLst/>
+          </a:prstGeom>
+          <a:noFill/>
+        </p:spPr>
+        <p:txBody>
+          <a:bodyPr wrap="square" rtlCol="0">
+            <a:spAutoFit/>
+          </a:bodyPr>
+          <a:lstStyle/>
+          <a:p>
+            <a:r>
+              <a:rPr lang="en-US" dirty="0" smtClean="0"/>
+              <a:t>I implemented a python script that sent a random value between 0 and 1000 via the API to Datadog. </a:t>
+            </a:r>
+          </a:p>
+          <a:p>
+            <a:endParaRPr lang="en-US" dirty="0"/>
+          </a:p>
+          <a:p>
+            <a:r>
+              <a:rPr lang="en-US" dirty="0" smtClean="0"/>
+              <a:t>I also developed a script that called the data generating script every 45 seconds.</a:t>
+            </a:r>
+            <a:endParaRPr lang="en-US" dirty="0"/>
+          </a:p>
+        </p:txBody>
+      </p:sp>
+      <p:sp>
+        <p:nvSpPr>
+          <p:cNvPr id="3" name="TextBox 2"/>
+          <p:cNvSpPr txBox="1"/>
+          <p:nvPr/>
+        </p:nvSpPr>
+        <p:spPr>
+          <a:xfrm>
+            <a:off x="5488384" y="1179382"/>
+            <a:ext cx="2404004" cy="369332"/>
+          </a:xfrm>
+          <a:prstGeom prst="rect">
+            <a:avLst/>
+          </a:prstGeom>
+          <a:noFill/>
+        </p:spPr>
+        <p:txBody>
+          <a:bodyPr wrap="square" rtlCol="0">
+            <a:spAutoFit/>
+          </a:bodyPr>
+          <a:lstStyle/>
+          <a:p>
+            <a:r>
+              <a:rPr lang="en-US" dirty="0"/>
+              <a:t>i</a:t>
+            </a:r>
+            <a:r>
+              <a:rPr lang="en-US" dirty="0" smtClean="0"/>
+              <a:t>nterval.py</a:t>
+            </a:r>
+            <a:endParaRPr lang="en-US" dirty="0"/>
+          </a:p>
+        </p:txBody>
+      </p:sp>
+      <p:sp>
+        <p:nvSpPr>
+          <p:cNvPr id="7" name="TextBox 6"/>
+          <p:cNvSpPr txBox="1"/>
+          <p:nvPr/>
+        </p:nvSpPr>
+        <p:spPr>
+          <a:xfrm>
+            <a:off x="771095" y="3213887"/>
+            <a:ext cx="2766872" cy="369332"/>
+          </a:xfrm>
+          <a:prstGeom prst="rect">
+            <a:avLst/>
+          </a:prstGeom>
+          <a:noFill/>
+        </p:spPr>
+        <p:txBody>
+          <a:bodyPr wrap="square" rtlCol="0">
+            <a:spAutoFit/>
+          </a:bodyPr>
+          <a:lstStyle/>
+          <a:p>
+            <a:pPr algn="ctr"/>
+            <a:r>
+              <a:rPr lang="en-US" dirty="0" smtClean="0"/>
+              <a:t>custom_metric.py</a:t>
+            </a:r>
+            <a:endParaRPr lang="en-US" dirty="0"/>
+          </a:p>
+        </p:txBody>
+      </p:sp>
     </p:spTree>
     <p:extLst>
       <p:ext uri="{BB962C8B-B14F-4D97-AF65-F5344CB8AC3E}">
-        <p14:creationId xmlns:p14="http://schemas.microsoft.com/office/powerpoint/2010/main" val="494471336"/>
+        <p14:creationId xmlns:p14="http://schemas.microsoft.com/office/powerpoint/2010/main" val="1805985270"/>
       </p:ext>
     </p:extLst>
   </p:cSld>
@@ -5405,7 +5539,7 @@
       </p:sp>
       <p:pic>
         <p:nvPicPr>
-          <p:cNvPr id="4" name="Picture 3" descr="Screen Shot 2020-04-01 at 9.09.35 AM.png"/>
+          <p:cNvPr id="3" name="Picture 2" descr="Screen Shot 2020-04-01 at 9.07.17 AM.png"/>
           <p:cNvPicPr>
             <a:picLocks noChangeAspect="1"/>
           </p:cNvPicPr>
@@ -5425,48 +5559,48 @@
         </p:blipFill>
         <p:spPr>
           <a:xfrm>
-            <a:off x="1124986" y="904855"/>
-            <a:ext cx="6096000" cy="3149600"/>
+            <a:off x="226793" y="1780405"/>
+            <a:ext cx="7861897" cy="4254674"/>
           </a:xfrm>
           <a:prstGeom prst="rect">
             <a:avLst/>
           </a:prstGeom>
         </p:spPr>
       </p:pic>
-      <p:pic>
-        <p:nvPicPr>
-          <p:cNvPr id="5" name="Picture 4" descr="Screen Shot 2020-04-01 at 9.09.44 AM.png"/>
-          <p:cNvPicPr>
-            <a:picLocks noChangeAspect="1"/>
-          </p:cNvPicPr>
+      <p:sp>
+        <p:nvSpPr>
+          <p:cNvPr id="4" name="TextBox 3"/>
+          <p:cNvSpPr txBox="1"/>
           <p:nvPr/>
-        </p:nvPicPr>
-        <p:blipFill>
-          <a:blip r:embed="rId3">
-            <a:extLst>
-              <a:ext uri="{28A0092B-C50C-407E-A947-70E740481C1C}">
-                <a14:useLocalDpi xmlns:a14="http://schemas.microsoft.com/office/drawing/2010/main" val="0"/>
-              </a:ext>
-            </a:extLst>
-          </a:blip>
-          <a:stretch>
-            <a:fillRect/>
-          </a:stretch>
-        </p:blipFill>
-        <p:spPr>
-          <a:xfrm>
-            <a:off x="2084288" y="4357919"/>
-            <a:ext cx="4064000" cy="2374900"/>
+        </p:nvSpPr>
+        <p:spPr>
+          <a:xfrm>
+            <a:off x="226793" y="1018258"/>
+            <a:ext cx="7861897" cy="369332"/>
           </a:xfrm>
           <a:prstGeom prst="rect">
             <a:avLst/>
           </a:prstGeom>
-        </p:spPr>
-      </p:pic>
+          <a:noFill/>
+        </p:spPr>
+        <p:txBody>
+          <a:bodyPr wrap="square" rtlCol="0">
+            <a:spAutoFit/>
+          </a:bodyPr>
+          <a:lstStyle/>
+          <a:p>
+            <a:r>
+              <a:rPr lang="en-US" dirty="0" smtClean="0"/>
+              <a:t>The graph below shows the data generated by the python script.</a:t>
+            </a:r>
+            <a:endParaRPr lang="en-US" dirty="0"/>
+          </a:p>
+        </p:txBody>
+      </p:sp>
     </p:spTree>
     <p:extLst>
       <p:ext uri="{BB962C8B-B14F-4D97-AF65-F5344CB8AC3E}">
-        <p14:creationId xmlns:p14="http://schemas.microsoft.com/office/powerpoint/2010/main" val="1805985270"/>
+        <p14:creationId xmlns:p14="http://schemas.microsoft.com/office/powerpoint/2010/main" val="494471336"/>
       </p:ext>
     </p:extLst>
   </p:cSld>
@@ -5505,7 +5639,7 @@
         </p:nvSpPr>
         <p:spPr>
           <a:xfrm>
-            <a:off x="546832" y="-124742"/>
+            <a:off x="444772" y="-260822"/>
             <a:ext cx="8014594" cy="1143000"/>
           </a:xfrm>
         </p:spPr>
@@ -5529,6 +5663,36 @@
           </a:p>
         </p:txBody>
       </p:sp>
+      <p:pic>
+        <p:nvPicPr>
+          <p:cNvPr id="4" name="Picture 3" descr="Screen Shot 2020-04-01 at 9.17.40 AM.png"/>
+          <p:cNvPicPr>
+            <a:picLocks noChangeAspect="1"/>
+          </p:cNvPicPr>
+          <p:nvPr/>
+        </p:nvPicPr>
+        <p:blipFill>
+          <a:blip r:embed="rId2">
+            <a:extLst>
+              <a:ext uri="{28A0092B-C50C-407E-A947-70E740481C1C}">
+                <a14:useLocalDpi xmlns:a14="http://schemas.microsoft.com/office/drawing/2010/main" val="0"/>
+              </a:ext>
+            </a:extLst>
+          </a:blip>
+          <a:stretch>
+            <a:fillRect/>
+          </a:stretch>
+        </p:blipFill>
+        <p:spPr>
+          <a:xfrm>
+            <a:off x="1851607" y="1581068"/>
+            <a:ext cx="4462705" cy="5236349"/>
+          </a:xfrm>
+          <a:prstGeom prst="rect">
+            <a:avLst/>
+          </a:prstGeom>
+        </p:spPr>
+      </p:pic>
       <p:sp>
         <p:nvSpPr>
           <p:cNvPr id="3" name="TextBox 2"/>
@@ -5537,8 +5701,8 @@
         </p:nvSpPr>
         <p:spPr>
           <a:xfrm>
-            <a:off x="220877" y="1115299"/>
-            <a:ext cx="8241507" cy="4524316"/>
+            <a:off x="34021" y="748458"/>
+            <a:ext cx="8561426" cy="584776"/>
           </a:xfrm>
           <a:prstGeom prst="rect">
             <a:avLst/>
@@ -5552,108 +5716,17 @@
           <a:lstStyle/>
           <a:p>
             <a:r>
-              <a:rPr lang="en-US" dirty="0"/>
-              <a:t>Utilize the </a:t>
-            </a:r>
-            <a:r>
-              <a:rPr lang="en-US" dirty="0" err="1"/>
-              <a:t>Datadog</a:t>
-            </a:r>
-            <a:r>
-              <a:rPr lang="en-US" dirty="0"/>
-              <a:t> API to create a </a:t>
-            </a:r>
-            <a:r>
-              <a:rPr lang="en-US" dirty="0" err="1"/>
-              <a:t>Timeboard</a:t>
-            </a:r>
-            <a:r>
-              <a:rPr lang="en-US" dirty="0"/>
-              <a:t> that contains:</a:t>
-            </a:r>
-          </a:p>
-          <a:p>
-            <a:endParaRPr lang="en-US" dirty="0"/>
-          </a:p>
-          <a:p>
-            <a:r>
-              <a:rPr lang="en-US" dirty="0"/>
-              <a:t>* Your custom metric scoped over your host.</a:t>
-            </a:r>
-          </a:p>
-          <a:p>
-            <a:r>
-              <a:rPr lang="en-US" dirty="0"/>
-              <a:t>* Any metric from the Integration on your Database with the anomaly function applied.</a:t>
-            </a:r>
-          </a:p>
-          <a:p>
-            <a:r>
-              <a:rPr lang="en-US" dirty="0"/>
-              <a:t>* Your custom metric with the rollup function applied to sum up all the points for the past hour into one bucket</a:t>
-            </a:r>
-          </a:p>
-          <a:p>
-            <a:endParaRPr lang="en-US" dirty="0"/>
-          </a:p>
-          <a:p>
-            <a:r>
-              <a:rPr lang="en-US" dirty="0"/>
-              <a:t>Please be sure, when submitting your hiring challenge, to include the script that you've used to create this </a:t>
-            </a:r>
-            <a:r>
-              <a:rPr lang="en-US" dirty="0" err="1"/>
-              <a:t>Timeboard</a:t>
-            </a:r>
-            <a:r>
-              <a:rPr lang="en-US" dirty="0"/>
-              <a:t>.</a:t>
-            </a:r>
-          </a:p>
-          <a:p>
-            <a:endParaRPr lang="en-US" dirty="0"/>
-          </a:p>
-          <a:p>
-            <a:r>
-              <a:rPr lang="en-US" dirty="0"/>
-              <a:t>Once this is created, access the Dashboard from your Dashboard List in the UI:</a:t>
-            </a:r>
-          </a:p>
-          <a:p>
-            <a:endParaRPr lang="en-US" dirty="0"/>
-          </a:p>
-          <a:p>
-            <a:r>
-              <a:rPr lang="en-US" dirty="0"/>
-              <a:t>* Set the </a:t>
-            </a:r>
-            <a:r>
-              <a:rPr lang="en-US" dirty="0" err="1"/>
-              <a:t>Timeboard's</a:t>
-            </a:r>
-            <a:r>
-              <a:rPr lang="en-US" dirty="0"/>
-              <a:t> timeframe to the past 5 minutes</a:t>
-            </a:r>
-          </a:p>
-          <a:p>
-            <a:r>
-              <a:rPr lang="en-US" dirty="0"/>
-              <a:t>* Take a snapshot of this graph and use the @ notation to send it to yourself.</a:t>
-            </a:r>
-          </a:p>
-          <a:p>
-            <a:r>
-              <a:rPr lang="en-US" dirty="0"/>
-              <a:t>* **Bonus Question**: What is the Anomaly graph displaying?</a:t>
-            </a:r>
+              <a:rPr lang="en-US" sz="1600" dirty="0" smtClean="0"/>
+              <a:t>This python script generate a dashboard with a graph for the postgresql database with the anomaly function applied,  my custom metric, and my custom metric with a one hour roll up.</a:t>
+            </a:r>
+            <a:endParaRPr lang="en-US" sz="1600" dirty="0"/>
           </a:p>
         </p:txBody>
       </p:sp>
     </p:spTree>
     <p:extLst>
       <p:ext uri="{BB962C8B-B14F-4D97-AF65-F5344CB8AC3E}">
-        <p14:creationId xmlns:p14="http://schemas.microsoft.com/office/powerpoint/2010/main" val="3043120717"/>
+        <p14:creationId xmlns:p14="http://schemas.microsoft.com/office/powerpoint/2010/main" val="1729009654"/>
       </p:ext>
     </p:extLst>
   </p:cSld>
@@ -5692,8 +5765,8 @@
         </p:nvSpPr>
         <p:spPr>
           <a:xfrm>
-            <a:off x="546832" y="-124742"/>
-            <a:ext cx="8014594" cy="1143000"/>
+            <a:off x="192774" y="-238144"/>
+            <a:ext cx="8289275" cy="1143000"/>
           </a:xfrm>
         </p:spPr>
         <p:txBody>
@@ -5718,7 +5791,7 @@
       </p:sp>
       <p:pic>
         <p:nvPicPr>
-          <p:cNvPr id="4" name="Picture 3" descr="Screen Shot 2020-04-01 at 9.17.40 AM.png"/>
+          <p:cNvPr id="5" name="Picture 4" descr="Screen Shot 2020-04-01 at 9.19.10 AM.png"/>
           <p:cNvPicPr>
             <a:picLocks noChangeAspect="1"/>
           </p:cNvPicPr>
@@ -5738,18 +5811,78 @@
         </p:blipFill>
         <p:spPr>
           <a:xfrm>
-            <a:off x="1681512" y="1018258"/>
-            <a:ext cx="4462705" cy="5236349"/>
+            <a:off x="0" y="1196163"/>
+            <a:ext cx="8401793" cy="4621372"/>
           </a:xfrm>
           <a:prstGeom prst="rect">
             <a:avLst/>
           </a:prstGeom>
         </p:spPr>
       </p:pic>
+      <p:sp>
+        <p:nvSpPr>
+          <p:cNvPr id="6" name="TextBox 5"/>
+          <p:cNvSpPr txBox="1"/>
+          <p:nvPr/>
+        </p:nvSpPr>
+        <p:spPr>
+          <a:xfrm>
+            <a:off x="170095" y="5817535"/>
+            <a:ext cx="8231698" cy="923330"/>
+          </a:xfrm>
+          <a:prstGeom prst="rect">
+            <a:avLst/>
+          </a:prstGeom>
+          <a:noFill/>
+        </p:spPr>
+        <p:txBody>
+          <a:bodyPr wrap="square" rtlCol="0">
+            <a:spAutoFit/>
+          </a:bodyPr>
+          <a:lstStyle/>
+          <a:p>
+            <a:r>
+              <a:rPr lang="en-US" dirty="0" smtClean="0"/>
+              <a:t>The anomaly graph is displaying rows inserted into the database with the basic anomaly algorithm applied and a set of two bounds. The basic algorithm uses a lagging rolling quantile computation to determine the range of expected values.</a:t>
+            </a:r>
+            <a:endParaRPr lang="en-US" dirty="0"/>
+          </a:p>
+        </p:txBody>
+      </p:sp>
+      <p:sp>
+        <p:nvSpPr>
+          <p:cNvPr id="3" name="TextBox 2"/>
+          <p:cNvSpPr txBox="1"/>
+          <p:nvPr/>
+        </p:nvSpPr>
+        <p:spPr>
+          <a:xfrm>
+            <a:off x="283491" y="748456"/>
+            <a:ext cx="7926406" cy="369332"/>
+          </a:xfrm>
+          <a:prstGeom prst="rect">
+            <a:avLst/>
+          </a:prstGeom>
+          <a:noFill/>
+        </p:spPr>
+        <p:txBody>
+          <a:bodyPr wrap="square" rtlCol="0">
+            <a:spAutoFit/>
+          </a:bodyPr>
+          <a:lstStyle/>
+          <a:p>
+            <a:r>
+              <a:rPr lang="en-US" dirty="0" smtClean="0"/>
+              <a:t>API generated custom dashboard</a:t>
+            </a:r>
+            <a:endParaRPr lang="en-US" dirty="0"/>
+          </a:p>
+        </p:txBody>
+      </p:sp>
     </p:spTree>
     <p:extLst>
       <p:ext uri="{BB962C8B-B14F-4D97-AF65-F5344CB8AC3E}">
-        <p14:creationId xmlns:p14="http://schemas.microsoft.com/office/powerpoint/2010/main" val="1729009654"/>
+        <p14:creationId xmlns:p14="http://schemas.microsoft.com/office/powerpoint/2010/main" val="1683883774"/>
       </p:ext>
     </p:extLst>
   </p:cSld>
@@ -5802,7 +5935,7 @@
                   <a:schemeClr val="tx1"/>
                 </a:solidFill>
               </a:rPr>
-              <a:t>Visualizing Data</a:t>
+              <a:t>Monitoring Data</a:t>
             </a:r>
             <a:endParaRPr lang="en-US" dirty="0">
               <a:solidFill>
@@ -5814,7 +5947,7 @@
       </p:sp>
       <p:pic>
         <p:nvPicPr>
-          <p:cNvPr id="5" name="Picture 4" descr="Screen Shot 2020-04-01 at 9.19.10 AM.png"/>
+          <p:cNvPr id="3" name="Picture 2" descr="Screen Shot 2020-04-01 at 12.25.41 PM.png"/>
           <p:cNvPicPr>
             <a:picLocks noChangeAspect="1"/>
           </p:cNvPicPr>
@@ -5834,8 +5967,8 @@
         </p:blipFill>
         <p:spPr>
           <a:xfrm>
-            <a:off x="0" y="1018258"/>
-            <a:ext cx="8401793" cy="4621372"/>
+            <a:off x="1520974" y="1664651"/>
+            <a:ext cx="5328166" cy="4951221"/>
           </a:xfrm>
           <a:prstGeom prst="rect">
             <a:avLst/>
@@ -5844,14 +5977,14 @@
       </p:pic>
       <p:sp>
         <p:nvSpPr>
-          <p:cNvPr id="6" name="TextBox 5"/>
+          <p:cNvPr id="4" name="TextBox 3"/>
           <p:cNvSpPr txBox="1"/>
           <p:nvPr/>
         </p:nvSpPr>
         <p:spPr>
           <a:xfrm>
-            <a:off x="170095" y="5817535"/>
-            <a:ext cx="8231698" cy="369332"/>
+            <a:off x="464925" y="927538"/>
+            <a:ext cx="7495500" cy="646331"/>
           </a:xfrm>
           <a:prstGeom prst="rect">
             <a:avLst/>
@@ -5866,7 +5999,7 @@
           <a:p>
             <a:r>
               <a:rPr lang="en-US" dirty="0" smtClean="0"/>
-              <a:t>What is the anomaly graph displaying?</a:t>
+              <a:t>The email below was triggered because my_metric had a value over 500 for a period greater than five minutes. </a:t>
             </a:r>
             <a:endParaRPr lang="en-US" dirty="0"/>
           </a:p>
@@ -5875,7 +6008,7 @@
     </p:spTree>
     <p:extLst>
       <p:ext uri="{BB962C8B-B14F-4D97-AF65-F5344CB8AC3E}">
-        <p14:creationId xmlns:p14="http://schemas.microsoft.com/office/powerpoint/2010/main" val="1683883774"/>
+        <p14:creationId xmlns:p14="http://schemas.microsoft.com/office/powerpoint/2010/main" val="1944655690"/>
       </p:ext>
     </p:extLst>
   </p:cSld>

</xml_diff>